<commit_message>
removed placeholder for gantt chart
</commit_message>
<xml_diff>
--- a/Deliverable2/Presentation/Rock_Stars_Presentation.pptx
+++ b/Deliverable2/Presentation/Rock_Stars_Presentation.pptx
@@ -11,40 +11,39 @@
     <p:sldMasterId id="2147483669" r:id="rId7"/>
   </p:sldMasterIdLst>
   <p:notesMasterIdLst>
-    <p:notesMasterId r:id="rId22"/>
+    <p:notesMasterId r:id="rId21"/>
   </p:notesMasterIdLst>
   <p:sldIdLst>
     <p:sldId id="256" r:id="rId8"/>
     <p:sldId id="257" r:id="rId9"/>
     <p:sldId id="259" r:id="rId10"/>
     <p:sldId id="268" r:id="rId11"/>
-    <p:sldId id="272" r:id="rId12"/>
-    <p:sldId id="277" r:id="rId13"/>
-    <p:sldId id="269" r:id="rId14"/>
-    <p:sldId id="273" r:id="rId15"/>
-    <p:sldId id="274" r:id="rId16"/>
-    <p:sldId id="270" r:id="rId17"/>
-    <p:sldId id="275" r:id="rId18"/>
-    <p:sldId id="276" r:id="rId19"/>
-    <p:sldId id="261" r:id="rId20"/>
-    <p:sldId id="266" r:id="rId21"/>
+    <p:sldId id="277" r:id="rId12"/>
+    <p:sldId id="269" r:id="rId13"/>
+    <p:sldId id="273" r:id="rId14"/>
+    <p:sldId id="274" r:id="rId15"/>
+    <p:sldId id="270" r:id="rId16"/>
+    <p:sldId id="275" r:id="rId17"/>
+    <p:sldId id="276" r:id="rId18"/>
+    <p:sldId id="261" r:id="rId19"/>
+    <p:sldId id="266" r:id="rId20"/>
   </p:sldIdLst>
   <p:sldSz cx="9144000" cy="6858000" type="screen4x3"/>
   <p:notesSz cx="6858000" cy="9144000"/>
   <p:embeddedFontLst>
     <p:embeddedFont>
       <p:font typeface="Calibri" panose="020F0502020204030204" pitchFamily="34" charset="0"/>
-      <p:regular r:id="rId23"/>
-      <p:bold r:id="rId24"/>
-      <p:italic r:id="rId25"/>
-      <p:boldItalic r:id="rId26"/>
+      <p:regular r:id="rId22"/>
+      <p:bold r:id="rId23"/>
+      <p:italic r:id="rId24"/>
+      <p:boldItalic r:id="rId25"/>
     </p:embeddedFont>
     <p:embeddedFont>
       <p:font typeface="Roboto" panose="020B0604020202020204" charset="0"/>
-      <p:regular r:id="rId27"/>
-      <p:bold r:id="rId28"/>
-      <p:italic r:id="rId29"/>
-      <p:boldItalic r:id="rId30"/>
+      <p:regular r:id="rId26"/>
+      <p:bold r:id="rId27"/>
+      <p:italic r:id="rId28"/>
+      <p:boldItalic r:id="rId29"/>
     </p:embeddedFont>
   </p:embeddedFontLst>
   <p:defaultTextStyle>
@@ -729,7 +728,7 @@
     </p:spTree>
     <p:extLst>
       <p:ext uri="{BB962C8B-B14F-4D97-AF65-F5344CB8AC3E}">
-        <p14:creationId xmlns:p14="http://schemas.microsoft.com/office/powerpoint/2010/main" val="304042687"/>
+        <p14:creationId xmlns:p14="http://schemas.microsoft.com/office/powerpoint/2010/main" val="1998830559"/>
       </p:ext>
     </p:extLst>
   </p:cSld>
@@ -740,116 +739,6 @@
 </file>
 
 <file path=ppt/notesSlides/notesSlide11.xml><?xml version="1.0" encoding="utf-8"?>
-<p:notes xmlns:a="http://schemas.openxmlformats.org/drawingml/2006/main" xmlns:r="http://schemas.openxmlformats.org/officeDocument/2006/relationships" xmlns:p="http://schemas.openxmlformats.org/presentationml/2006/main" showMasterSp="0" showMasterPhAnim="0">
-  <p:cSld>
-    <p:spTree>
-      <p:nvGrpSpPr>
-        <p:cNvPr id="1" name="Shape 128"/>
-        <p:cNvGrpSpPr/>
-        <p:nvPr/>
-      </p:nvGrpSpPr>
-      <p:grpSpPr>
-        <a:xfrm>
-          <a:off x="0" y="0"/>
-          <a:ext cx="0" cy="0"/>
-          <a:chOff x="0" y="0"/>
-          <a:chExt cx="0" cy="0"/>
-        </a:xfrm>
-      </p:grpSpPr>
-      <p:sp>
-        <p:nvSpPr>
-          <p:cNvPr id="129" name="Shape 129"/>
-          <p:cNvSpPr txBox="1">
-            <a:spLocks noGrp="1"/>
-          </p:cNvSpPr>
-          <p:nvPr>
-            <p:ph type="body" idx="1"/>
-          </p:nvPr>
-        </p:nvSpPr>
-        <p:spPr>
-          <a:xfrm>
-            <a:off x="685800" y="4343400"/>
-            <a:ext cx="5486399" cy="4114800"/>
-          </a:xfrm>
-          <a:prstGeom prst="rect">
-            <a:avLst/>
-          </a:prstGeom>
-          <a:noFill/>
-          <a:ln>
-            <a:noFill/>
-          </a:ln>
-        </p:spPr>
-        <p:txBody>
-          <a:bodyPr lIns="91425" tIns="91425" rIns="91425" bIns="91425" anchor="ctr" anchorCtr="0">
-            <a:noAutofit/>
-          </a:bodyPr>
-          <a:lstStyle/>
-          <a:p>
-            <a:pPr lvl="0">
-              <a:spcBef>
-                <a:spcPts val="0"/>
-              </a:spcBef>
-              <a:buNone/>
-            </a:pPr>
-            <a:endParaRPr dirty="0"/>
-          </a:p>
-        </p:txBody>
-      </p:sp>
-      <p:sp>
-        <p:nvSpPr>
-          <p:cNvPr id="130" name="Shape 130"/>
-          <p:cNvSpPr>
-            <a:spLocks noGrp="1" noRot="1" noChangeAspect="1"/>
-          </p:cNvSpPr>
-          <p:nvPr>
-            <p:ph type="sldImg" idx="2"/>
-          </p:nvPr>
-        </p:nvSpPr>
-        <p:spPr>
-          <a:xfrm>
-            <a:off x="1143000" y="685800"/>
-            <a:ext cx="4572000" cy="3429000"/>
-          </a:xfrm>
-          <a:custGeom>
-            <a:avLst/>
-            <a:gdLst/>
-            <a:ahLst/>
-            <a:cxnLst/>
-            <a:rect l="0" t="0" r="0" b="0"/>
-            <a:pathLst>
-              <a:path w="120000" h="120000" extrusionOk="0">
-                <a:moveTo>
-                  <a:pt x="0" y="0"/>
-                </a:moveTo>
-                <a:lnTo>
-                  <a:pt x="120000" y="0"/>
-                </a:lnTo>
-                <a:lnTo>
-                  <a:pt x="120000" y="120000"/>
-                </a:lnTo>
-                <a:lnTo>
-                  <a:pt x="0" y="120000"/>
-                </a:lnTo>
-                <a:close/>
-              </a:path>
-            </a:pathLst>
-          </a:custGeom>
-        </p:spPr>
-      </p:sp>
-    </p:spTree>
-    <p:extLst>
-      <p:ext uri="{BB962C8B-B14F-4D97-AF65-F5344CB8AC3E}">
-        <p14:creationId xmlns:p14="http://schemas.microsoft.com/office/powerpoint/2010/main" val="1998830559"/>
-      </p:ext>
-    </p:extLst>
-  </p:cSld>
-  <p:clrMapOvr>
-    <a:masterClrMapping/>
-  </p:clrMapOvr>
-</p:notes>
-</file>
-
-<file path=ppt/notesSlides/notesSlide12.xml><?xml version="1.0" encoding="utf-8"?>
 <p:notes xmlns:a="http://schemas.openxmlformats.org/drawingml/2006/main" xmlns:r="http://schemas.openxmlformats.org/officeDocument/2006/relationships" xmlns:p="http://schemas.openxmlformats.org/presentationml/2006/main" showMasterSp="0" showMasterPhAnim="0">
   <p:cSld>
     <p:spTree>
@@ -959,7 +848,7 @@
 </p:notes>
 </file>
 
-<file path=ppt/notesSlides/notesSlide13.xml><?xml version="1.0" encoding="utf-8"?>
+<file path=ppt/notesSlides/notesSlide12.xml><?xml version="1.0" encoding="utf-8"?>
 <p:notes xmlns:a="http://schemas.openxmlformats.org/drawingml/2006/main" xmlns:r="http://schemas.openxmlformats.org/officeDocument/2006/relationships" xmlns:p="http://schemas.openxmlformats.org/presentationml/2006/main" showMasterSp="0" showMasterPhAnim="0">
   <p:cSld>
     <p:spTree>
@@ -1069,7 +958,7 @@
 </p:notes>
 </file>
 
-<file path=ppt/notesSlides/notesSlide14.xml><?xml version="1.0" encoding="utf-8"?>
+<file path=ppt/notesSlides/notesSlide13.xml><?xml version="1.0" encoding="utf-8"?>
 <p:notes xmlns:a="http://schemas.openxmlformats.org/drawingml/2006/main" xmlns:r="http://schemas.openxmlformats.org/officeDocument/2006/relationships" xmlns:p="http://schemas.openxmlformats.org/presentationml/2006/main" showMasterSp="0" showMasterPhAnim="0">
   <p:cSld>
     <p:spTree>
@@ -1609,7 +1498,7 @@
     </p:spTree>
     <p:extLst>
       <p:ext uri="{BB962C8B-B14F-4D97-AF65-F5344CB8AC3E}">
-        <p14:creationId xmlns:p14="http://schemas.microsoft.com/office/powerpoint/2010/main" val="1204391587"/>
+        <p14:creationId xmlns:p14="http://schemas.microsoft.com/office/powerpoint/2010/main" val="2406691360"/>
       </p:ext>
     </p:extLst>
   </p:cSld>
@@ -1620,116 +1509,6 @@
 </file>
 
 <file path=ppt/notesSlides/notesSlide6.xml><?xml version="1.0" encoding="utf-8"?>
-<p:notes xmlns:a="http://schemas.openxmlformats.org/drawingml/2006/main" xmlns:r="http://schemas.openxmlformats.org/officeDocument/2006/relationships" xmlns:p="http://schemas.openxmlformats.org/presentationml/2006/main" showMasterSp="0" showMasterPhAnim="0">
-  <p:cSld>
-    <p:spTree>
-      <p:nvGrpSpPr>
-        <p:cNvPr id="1" name="Shape 134"/>
-        <p:cNvGrpSpPr/>
-        <p:nvPr/>
-      </p:nvGrpSpPr>
-      <p:grpSpPr>
-        <a:xfrm>
-          <a:off x="0" y="0"/>
-          <a:ext cx="0" cy="0"/>
-          <a:chOff x="0" y="0"/>
-          <a:chExt cx="0" cy="0"/>
-        </a:xfrm>
-      </p:grpSpPr>
-      <p:sp>
-        <p:nvSpPr>
-          <p:cNvPr id="135" name="Shape 135"/>
-          <p:cNvSpPr txBox="1">
-            <a:spLocks noGrp="1"/>
-          </p:cNvSpPr>
-          <p:nvPr>
-            <p:ph type="body" idx="1"/>
-          </p:nvPr>
-        </p:nvSpPr>
-        <p:spPr>
-          <a:xfrm>
-            <a:off x="685800" y="4343400"/>
-            <a:ext cx="5486399" cy="4114800"/>
-          </a:xfrm>
-          <a:prstGeom prst="rect">
-            <a:avLst/>
-          </a:prstGeom>
-          <a:noFill/>
-          <a:ln>
-            <a:noFill/>
-          </a:ln>
-        </p:spPr>
-        <p:txBody>
-          <a:bodyPr lIns="91425" tIns="91425" rIns="91425" bIns="91425" anchor="ctr" anchorCtr="0">
-            <a:noAutofit/>
-          </a:bodyPr>
-          <a:lstStyle/>
-          <a:p>
-            <a:pPr lvl="0">
-              <a:spcBef>
-                <a:spcPts val="0"/>
-              </a:spcBef>
-              <a:buNone/>
-            </a:pPr>
-            <a:endParaRPr dirty="0"/>
-          </a:p>
-        </p:txBody>
-      </p:sp>
-      <p:sp>
-        <p:nvSpPr>
-          <p:cNvPr id="136" name="Shape 136"/>
-          <p:cNvSpPr>
-            <a:spLocks noGrp="1" noRot="1" noChangeAspect="1"/>
-          </p:cNvSpPr>
-          <p:nvPr>
-            <p:ph type="sldImg" idx="2"/>
-          </p:nvPr>
-        </p:nvSpPr>
-        <p:spPr>
-          <a:xfrm>
-            <a:off x="1143000" y="685800"/>
-            <a:ext cx="4572000" cy="3429000"/>
-          </a:xfrm>
-          <a:custGeom>
-            <a:avLst/>
-            <a:gdLst/>
-            <a:ahLst/>
-            <a:cxnLst/>
-            <a:rect l="0" t="0" r="0" b="0"/>
-            <a:pathLst>
-              <a:path w="120000" h="120000" extrusionOk="0">
-                <a:moveTo>
-                  <a:pt x="0" y="0"/>
-                </a:moveTo>
-                <a:lnTo>
-                  <a:pt x="120000" y="0"/>
-                </a:lnTo>
-                <a:lnTo>
-                  <a:pt x="120000" y="120000"/>
-                </a:lnTo>
-                <a:lnTo>
-                  <a:pt x="0" y="120000"/>
-                </a:lnTo>
-                <a:close/>
-              </a:path>
-            </a:pathLst>
-          </a:custGeom>
-        </p:spPr>
-      </p:sp>
-    </p:spTree>
-    <p:extLst>
-      <p:ext uri="{BB962C8B-B14F-4D97-AF65-F5344CB8AC3E}">
-        <p14:creationId xmlns:p14="http://schemas.microsoft.com/office/powerpoint/2010/main" val="2406691360"/>
-      </p:ext>
-    </p:extLst>
-  </p:cSld>
-  <p:clrMapOvr>
-    <a:masterClrMapping/>
-  </p:clrMapOvr>
-</p:notes>
-</file>
-
-<file path=ppt/notesSlides/notesSlide7.xml><?xml version="1.0" encoding="utf-8"?>
 <p:notes xmlns:a="http://schemas.openxmlformats.org/drawingml/2006/main" xmlns:r="http://schemas.openxmlformats.org/officeDocument/2006/relationships" xmlns:p="http://schemas.openxmlformats.org/presentationml/2006/main" showMasterSp="0" showMasterPhAnim="0">
   <p:cSld>
     <p:spTree>
@@ -1839,7 +1618,7 @@
 </p:notes>
 </file>
 
-<file path=ppt/notesSlides/notesSlide8.xml><?xml version="1.0" encoding="utf-8"?>
+<file path=ppt/notesSlides/notesSlide7.xml><?xml version="1.0" encoding="utf-8"?>
 <p:notes xmlns:a="http://schemas.openxmlformats.org/drawingml/2006/main" xmlns:r="http://schemas.openxmlformats.org/officeDocument/2006/relationships" xmlns:p="http://schemas.openxmlformats.org/presentationml/2006/main" showMasterSp="0" showMasterPhAnim="0">
   <p:cSld>
     <p:spTree>
@@ -1949,7 +1728,7 @@
 </p:notes>
 </file>
 
-<file path=ppt/notesSlides/notesSlide9.xml><?xml version="1.0" encoding="utf-8"?>
+<file path=ppt/notesSlides/notesSlide8.xml><?xml version="1.0" encoding="utf-8"?>
 <p:notes xmlns:a="http://schemas.openxmlformats.org/drawingml/2006/main" xmlns:r="http://schemas.openxmlformats.org/officeDocument/2006/relationships" xmlns:p="http://schemas.openxmlformats.org/presentationml/2006/main" showMasterSp="0" showMasterPhAnim="0">
   <p:cSld>
     <p:spTree>
@@ -2050,6 +1829,116 @@
     <p:extLst>
       <p:ext uri="{BB962C8B-B14F-4D97-AF65-F5344CB8AC3E}">
         <p14:creationId xmlns:p14="http://schemas.microsoft.com/office/powerpoint/2010/main" val="2185680185"/>
+      </p:ext>
+    </p:extLst>
+  </p:cSld>
+  <p:clrMapOvr>
+    <a:masterClrMapping/>
+  </p:clrMapOvr>
+</p:notes>
+</file>
+
+<file path=ppt/notesSlides/notesSlide9.xml><?xml version="1.0" encoding="utf-8"?>
+<p:notes xmlns:a="http://schemas.openxmlformats.org/drawingml/2006/main" xmlns:r="http://schemas.openxmlformats.org/officeDocument/2006/relationships" xmlns:p="http://schemas.openxmlformats.org/presentationml/2006/main" showMasterSp="0" showMasterPhAnim="0">
+  <p:cSld>
+    <p:spTree>
+      <p:nvGrpSpPr>
+        <p:cNvPr id="1" name="Shape 128"/>
+        <p:cNvGrpSpPr/>
+        <p:nvPr/>
+      </p:nvGrpSpPr>
+      <p:grpSpPr>
+        <a:xfrm>
+          <a:off x="0" y="0"/>
+          <a:ext cx="0" cy="0"/>
+          <a:chOff x="0" y="0"/>
+          <a:chExt cx="0" cy="0"/>
+        </a:xfrm>
+      </p:grpSpPr>
+      <p:sp>
+        <p:nvSpPr>
+          <p:cNvPr id="129" name="Shape 129"/>
+          <p:cNvSpPr txBox="1">
+            <a:spLocks noGrp="1"/>
+          </p:cNvSpPr>
+          <p:nvPr>
+            <p:ph type="body" idx="1"/>
+          </p:nvPr>
+        </p:nvSpPr>
+        <p:spPr>
+          <a:xfrm>
+            <a:off x="685800" y="4343400"/>
+            <a:ext cx="5486399" cy="4114800"/>
+          </a:xfrm>
+          <a:prstGeom prst="rect">
+            <a:avLst/>
+          </a:prstGeom>
+          <a:noFill/>
+          <a:ln>
+            <a:noFill/>
+          </a:ln>
+        </p:spPr>
+        <p:txBody>
+          <a:bodyPr lIns="91425" tIns="91425" rIns="91425" bIns="91425" anchor="ctr" anchorCtr="0">
+            <a:noAutofit/>
+          </a:bodyPr>
+          <a:lstStyle/>
+          <a:p>
+            <a:pPr lvl="0">
+              <a:spcBef>
+                <a:spcPts val="0"/>
+              </a:spcBef>
+              <a:buNone/>
+            </a:pPr>
+            <a:endParaRPr dirty="0"/>
+          </a:p>
+        </p:txBody>
+      </p:sp>
+      <p:sp>
+        <p:nvSpPr>
+          <p:cNvPr id="130" name="Shape 130"/>
+          <p:cNvSpPr>
+            <a:spLocks noGrp="1" noRot="1" noChangeAspect="1"/>
+          </p:cNvSpPr>
+          <p:nvPr>
+            <p:ph type="sldImg" idx="2"/>
+          </p:nvPr>
+        </p:nvSpPr>
+        <p:spPr>
+          <a:xfrm>
+            <a:off x="1143000" y="685800"/>
+            <a:ext cx="4572000" cy="3429000"/>
+          </a:xfrm>
+          <a:custGeom>
+            <a:avLst/>
+            <a:gdLst/>
+            <a:ahLst/>
+            <a:cxnLst/>
+            <a:rect l="0" t="0" r="0" b="0"/>
+            <a:pathLst>
+              <a:path w="120000" h="120000" extrusionOk="0">
+                <a:moveTo>
+                  <a:pt x="0" y="0"/>
+                </a:moveTo>
+                <a:lnTo>
+                  <a:pt x="120000" y="0"/>
+                </a:lnTo>
+                <a:lnTo>
+                  <a:pt x="120000" y="120000"/>
+                </a:lnTo>
+                <a:lnTo>
+                  <a:pt x="0" y="120000"/>
+                </a:lnTo>
+                <a:close/>
+              </a:path>
+            </a:pathLst>
+          </a:custGeom>
+        </p:spPr>
+      </p:sp>
+    </p:spTree>
+    <p:extLst>
+      <p:ext uri="{BB962C8B-B14F-4D97-AF65-F5344CB8AC3E}">
+        <p14:creationId xmlns:p14="http://schemas.microsoft.com/office/powerpoint/2010/main" val="304042687"/>
       </p:ext>
     </p:extLst>
   </p:cSld>
@@ -19008,15 +18897,18 @@
               <a:buFont typeface="Arial"/>
               <a:buNone/>
             </a:pPr>
-            <a:endParaRPr lang="en-US" sz="2400" b="0" i="0" u="none" strike="noStrike" cap="none" dirty="0" smtClean="0">
-              <a:solidFill>
-                <a:schemeClr val="lt1"/>
-              </a:solidFill>
-              <a:latin typeface="Calibri"/>
-              <a:ea typeface="Calibri"/>
-              <a:cs typeface="Calibri"/>
-              <a:sym typeface="Calibri"/>
-            </a:endParaRPr>
+            <a:r>
+              <a:rPr lang="en-US" sz="1800" b="0" i="0" u="none" strike="noStrike" cap="none" dirty="0" smtClean="0">
+                <a:solidFill>
+                  <a:schemeClr val="lt1"/>
+                </a:solidFill>
+                <a:latin typeface="Calibri"/>
+                <a:ea typeface="Calibri"/>
+                <a:cs typeface="Calibri"/>
+                <a:sym typeface="Calibri"/>
+              </a:rPr>
+              <a:t>When the user hits “Plan My Trip”, the dashboard shows up with following options</a:t>
+            </a:r>
           </a:p>
           <a:p>
             <a:pPr marL="0" marR="0" lvl="0" indent="0" algn="l" rtl="0">
@@ -19033,10 +18925,10 @@
               <a:buFont typeface="Arial"/>
               <a:buNone/>
             </a:pPr>
-            <a:endParaRPr lang="en-US" dirty="0"/>
+            <a:endParaRPr lang="en-US" sz="1800" dirty="0" smtClean="0"/>
           </a:p>
           <a:p>
-            <a:pPr marL="0" marR="0" lvl="0" indent="0" algn="l" rtl="0">
+            <a:pPr marL="285750" marR="0" lvl="0" indent="-285750" algn="l" rtl="0">
               <a:spcBef>
                 <a:spcPts val="1080"/>
               </a:spcBef>
@@ -19047,21 +18939,16 @@
                 <a:schemeClr val="lt1"/>
               </a:buClr>
               <a:buSzPct val="25000"/>
-              <a:buFont typeface="Arial"/>
-              <a:buNone/>
+              <a:buFont typeface="Wingdings" panose="05000000000000000000" pitchFamily="2" charset="2"/>
+              <a:buChar char="v"/>
             </a:pPr>
-            <a:endParaRPr lang="en-US" sz="2400" b="0" i="0" u="none" strike="noStrike" cap="none" dirty="0" smtClean="0">
-              <a:solidFill>
-                <a:schemeClr val="lt1"/>
-              </a:solidFill>
-              <a:latin typeface="Calibri"/>
-              <a:ea typeface="Calibri"/>
-              <a:cs typeface="Calibri"/>
-              <a:sym typeface="Calibri"/>
-            </a:endParaRPr>
+            <a:r>
+              <a:rPr lang="en-US" sz="1800" dirty="0" smtClean="0"/>
+              <a:t>Packing Checklist  - List of items to pack for the trip</a:t>
+            </a:r>
           </a:p>
           <a:p>
-            <a:pPr marL="0" marR="0" lvl="0" indent="0" algn="l" rtl="0">
+            <a:pPr marL="285750" marR="0" lvl="0" indent="-285750" algn="l" rtl="0">
               <a:spcBef>
                 <a:spcPts val="1080"/>
               </a:spcBef>
@@ -19072,25 +18959,8 @@
                 <a:schemeClr val="lt1"/>
               </a:buClr>
               <a:buSzPct val="25000"/>
-              <a:buFont typeface="Arial"/>
-              <a:buNone/>
-            </a:pPr>
-            <a:endParaRPr lang="en-US" dirty="0"/>
-          </a:p>
-          <a:p>
-            <a:pPr marL="0" marR="0" lvl="0" indent="0" algn="l" rtl="0">
-              <a:spcBef>
-                <a:spcPts val="1080"/>
-              </a:spcBef>
-              <a:spcAft>
-                <a:spcPts val="0"/>
-              </a:spcAft>
-              <a:buClr>
-                <a:schemeClr val="lt1"/>
-              </a:buClr>
-              <a:buSzPct val="25000"/>
-              <a:buFont typeface="Arial"/>
-              <a:buNone/>
+              <a:buFont typeface="Wingdings" panose="05000000000000000000" pitchFamily="2" charset="2"/>
+              <a:buChar char="v"/>
             </a:pPr>
             <a:r>
               <a:rPr lang="en-US" sz="1800" b="0" i="0" u="none" strike="noStrike" cap="none" dirty="0" smtClean="0">
@@ -19102,7 +18972,55 @@
                 <a:cs typeface="Calibri"/>
                 <a:sym typeface="Calibri"/>
               </a:rPr>
-              <a:t>This is the Welcome screen and the user can select the countries where she is travelling and also enter her D.O.B and select email  notifications and then hit “Plan My Trip”</a:t>
+              <a:t>Vaccine Checklist – List of vaccines necessary or required for this trip</a:t>
+            </a:r>
+          </a:p>
+          <a:p>
+            <a:pPr marL="285750" marR="0" lvl="0" indent="-285750" algn="l" rtl="0">
+              <a:spcBef>
+                <a:spcPts val="1080"/>
+              </a:spcBef>
+              <a:spcAft>
+                <a:spcPts val="0"/>
+              </a:spcAft>
+              <a:buClr>
+                <a:schemeClr val="lt1"/>
+              </a:buClr>
+              <a:buSzPct val="25000"/>
+              <a:buFont typeface="Wingdings" panose="05000000000000000000" pitchFamily="2" charset="2"/>
+              <a:buChar char="v"/>
+            </a:pPr>
+            <a:r>
+              <a:rPr lang="en-US" sz="1800" dirty="0" smtClean="0"/>
+              <a:t>Notifications – Set travel notifications for this trip</a:t>
+            </a:r>
+          </a:p>
+          <a:p>
+            <a:pPr marL="285750" marR="0" lvl="0" indent="-285750" algn="l" rtl="0">
+              <a:spcBef>
+                <a:spcPts val="1080"/>
+              </a:spcBef>
+              <a:spcAft>
+                <a:spcPts val="0"/>
+              </a:spcAft>
+              <a:buClr>
+                <a:schemeClr val="lt1"/>
+              </a:buClr>
+              <a:buSzPct val="25000"/>
+              <a:buFont typeface="Wingdings" panose="05000000000000000000" pitchFamily="2" charset="2"/>
+              <a:buChar char="v"/>
+            </a:pPr>
+            <a:r>
+              <a:rPr lang="en-US" sz="1800" b="0" i="0" u="none" strike="noStrike" cap="none" dirty="0" smtClean="0">
+                <a:solidFill>
+                  <a:schemeClr val="lt1"/>
+                </a:solidFill>
+                <a:latin typeface="Calibri"/>
+                <a:ea typeface="Calibri"/>
+                <a:cs typeface="Calibri"/>
+                <a:sym typeface="Calibri"/>
+              </a:rPr>
+              <a:t>Profile – View/Edit the user profile</a:t>
             </a:r>
             <a:endParaRPr sz="1800" b="0" i="0" u="none" strike="noStrike" cap="none" dirty="0">
               <a:solidFill>
@@ -19194,7 +19112,7 @@
       </p:sp>
       <p:pic>
         <p:nvPicPr>
-          <p:cNvPr id="2" name="Picture 1"/>
+          <p:cNvPr id="3" name="Picture 2"/>
           <p:cNvPicPr>
             <a:picLocks noChangeAspect="1"/>
           </p:cNvPicPr>
@@ -19208,8 +19126,8 @@
         </p:blipFill>
         <p:spPr>
           <a:xfrm>
-            <a:off x="1137384" y="818652"/>
-            <a:ext cx="6296025" cy="4429125"/>
+            <a:off x="137933" y="1169092"/>
+            <a:ext cx="8868131" cy="2032445"/>
           </a:xfrm>
           <a:prstGeom prst="rect">
             <a:avLst/>
@@ -19219,7 +19137,7 @@
     </p:spTree>
     <p:extLst>
       <p:ext uri="{BB962C8B-B14F-4D97-AF65-F5344CB8AC3E}">
-        <p14:creationId xmlns:p14="http://schemas.microsoft.com/office/powerpoint/2010/main" val="1709013539"/>
+        <p14:creationId xmlns:p14="http://schemas.microsoft.com/office/powerpoint/2010/main" val="2291339440"/>
       </p:ext>
     </p:extLst>
   </p:cSld>
@@ -19410,437 +19328,6 @@
               <a:buFont typeface="Arial"/>
               <a:buNone/>
             </a:pPr>
-            <a:r>
-              <a:rPr lang="en-US" sz="1800" b="0" i="0" u="none" strike="noStrike" cap="none" dirty="0" smtClean="0">
-                <a:solidFill>
-                  <a:schemeClr val="lt1"/>
-                </a:solidFill>
-                <a:latin typeface="Calibri"/>
-                <a:ea typeface="Calibri"/>
-                <a:cs typeface="Calibri"/>
-                <a:sym typeface="Calibri"/>
-              </a:rPr>
-              <a:t>When the user hits “Plan My Trip”, the dashboard shows up with following options</a:t>
-            </a:r>
-          </a:p>
-          <a:p>
-            <a:pPr marL="0" marR="0" lvl="0" indent="0" algn="l" rtl="0">
-              <a:spcBef>
-                <a:spcPts val="1080"/>
-              </a:spcBef>
-              <a:spcAft>
-                <a:spcPts val="0"/>
-              </a:spcAft>
-              <a:buClr>
-                <a:schemeClr val="lt1"/>
-              </a:buClr>
-              <a:buSzPct val="25000"/>
-              <a:buFont typeface="Arial"/>
-              <a:buNone/>
-            </a:pPr>
-            <a:endParaRPr lang="en-US" sz="1800" dirty="0" smtClean="0"/>
-          </a:p>
-          <a:p>
-            <a:pPr marL="285750" marR="0" lvl="0" indent="-285750" algn="l" rtl="0">
-              <a:spcBef>
-                <a:spcPts val="1080"/>
-              </a:spcBef>
-              <a:spcAft>
-                <a:spcPts val="0"/>
-              </a:spcAft>
-              <a:buClr>
-                <a:schemeClr val="lt1"/>
-              </a:buClr>
-              <a:buSzPct val="25000"/>
-              <a:buFont typeface="Wingdings" panose="05000000000000000000" pitchFamily="2" charset="2"/>
-              <a:buChar char="v"/>
-            </a:pPr>
-            <a:r>
-              <a:rPr lang="en-US" sz="1800" dirty="0" smtClean="0"/>
-              <a:t>Packing Checklist  - List of items to pack for the trip</a:t>
-            </a:r>
-          </a:p>
-          <a:p>
-            <a:pPr marL="285750" marR="0" lvl="0" indent="-285750" algn="l" rtl="0">
-              <a:spcBef>
-                <a:spcPts val="1080"/>
-              </a:spcBef>
-              <a:spcAft>
-                <a:spcPts val="0"/>
-              </a:spcAft>
-              <a:buClr>
-                <a:schemeClr val="lt1"/>
-              </a:buClr>
-              <a:buSzPct val="25000"/>
-              <a:buFont typeface="Wingdings" panose="05000000000000000000" pitchFamily="2" charset="2"/>
-              <a:buChar char="v"/>
-            </a:pPr>
-            <a:r>
-              <a:rPr lang="en-US" sz="1800" b="0" i="0" u="none" strike="noStrike" cap="none" dirty="0" smtClean="0">
-                <a:solidFill>
-                  <a:schemeClr val="lt1"/>
-                </a:solidFill>
-                <a:latin typeface="Calibri"/>
-                <a:ea typeface="Calibri"/>
-                <a:cs typeface="Calibri"/>
-                <a:sym typeface="Calibri"/>
-              </a:rPr>
-              <a:t>Vaccine Checklist – List of vaccines necessary or required for this trip</a:t>
-            </a:r>
-          </a:p>
-          <a:p>
-            <a:pPr marL="285750" marR="0" lvl="0" indent="-285750" algn="l" rtl="0">
-              <a:spcBef>
-                <a:spcPts val="1080"/>
-              </a:spcBef>
-              <a:spcAft>
-                <a:spcPts val="0"/>
-              </a:spcAft>
-              <a:buClr>
-                <a:schemeClr val="lt1"/>
-              </a:buClr>
-              <a:buSzPct val="25000"/>
-              <a:buFont typeface="Wingdings" panose="05000000000000000000" pitchFamily="2" charset="2"/>
-              <a:buChar char="v"/>
-            </a:pPr>
-            <a:r>
-              <a:rPr lang="en-US" sz="1800" dirty="0" smtClean="0"/>
-              <a:t>Notifications – Set travel notifications for this trip</a:t>
-            </a:r>
-          </a:p>
-          <a:p>
-            <a:pPr marL="285750" marR="0" lvl="0" indent="-285750" algn="l" rtl="0">
-              <a:spcBef>
-                <a:spcPts val="1080"/>
-              </a:spcBef>
-              <a:spcAft>
-                <a:spcPts val="0"/>
-              </a:spcAft>
-              <a:buClr>
-                <a:schemeClr val="lt1"/>
-              </a:buClr>
-              <a:buSzPct val="25000"/>
-              <a:buFont typeface="Wingdings" panose="05000000000000000000" pitchFamily="2" charset="2"/>
-              <a:buChar char="v"/>
-            </a:pPr>
-            <a:r>
-              <a:rPr lang="en-US" sz="1800" b="0" i="0" u="none" strike="noStrike" cap="none" dirty="0" smtClean="0">
-                <a:solidFill>
-                  <a:schemeClr val="lt1"/>
-                </a:solidFill>
-                <a:latin typeface="Calibri"/>
-                <a:ea typeface="Calibri"/>
-                <a:cs typeface="Calibri"/>
-                <a:sym typeface="Calibri"/>
-              </a:rPr>
-              <a:t>Profile – View/Edit the user profile</a:t>
-            </a:r>
-            <a:endParaRPr sz="1800" b="0" i="0" u="none" strike="noStrike" cap="none" dirty="0">
-              <a:solidFill>
-                <a:schemeClr val="lt1"/>
-              </a:solidFill>
-              <a:latin typeface="Calibri"/>
-              <a:ea typeface="Calibri"/>
-              <a:cs typeface="Calibri"/>
-              <a:sym typeface="Calibri"/>
-            </a:endParaRPr>
-          </a:p>
-        </p:txBody>
-      </p:sp>
-      <p:sp>
-        <p:nvSpPr>
-          <p:cNvPr id="133" name="Shape 133"/>
-          <p:cNvSpPr txBox="1">
-            <a:spLocks noGrp="1"/>
-          </p:cNvSpPr>
-          <p:nvPr>
-            <p:ph type="title"/>
-          </p:nvPr>
-        </p:nvSpPr>
-        <p:spPr>
-          <a:xfrm>
-            <a:off x="0" y="0"/>
-            <a:ext cx="9144000" cy="991351"/>
-          </a:xfrm>
-          <a:prstGeom prst="rect">
-            <a:avLst/>
-          </a:prstGeom>
-          <a:noFill/>
-          <a:ln>
-            <a:noFill/>
-          </a:ln>
-        </p:spPr>
-        <p:txBody>
-          <a:bodyPr lIns="274300" tIns="45700" rIns="91425" bIns="45700" anchor="ctr" anchorCtr="0">
-            <a:noAutofit/>
-          </a:bodyPr>
-          <a:lstStyle/>
-          <a:p>
-            <a:pPr marL="0" marR="0" lvl="0" indent="0" algn="l" rtl="0">
-              <a:spcBef>
-                <a:spcPts val="0"/>
-              </a:spcBef>
-              <a:buClr>
-                <a:srgbClr val="EEB211"/>
-              </a:buClr>
-              <a:buSzPct val="25000"/>
-              <a:buFont typeface="Calibri"/>
-              <a:buNone/>
-            </a:pPr>
-            <a:r>
-              <a:rPr lang="en-US" sz="2400" b="0" i="0" u="none" strike="noStrike" cap="none" dirty="0">
-                <a:solidFill>
-                  <a:srgbClr val="EEB211"/>
-                </a:solidFill>
-                <a:latin typeface="Calibri"/>
-                <a:ea typeface="Calibri"/>
-                <a:cs typeface="Calibri"/>
-                <a:sym typeface="Calibri"/>
-              </a:rPr>
-              <a:t> 			</a:t>
-            </a:r>
-            <a:r>
-              <a:rPr lang="en-US" sz="2400" b="0" i="0" u="none" strike="noStrike" cap="none" dirty="0" smtClean="0">
-                <a:solidFill>
-                  <a:srgbClr val="EEB211"/>
-                </a:solidFill>
-                <a:latin typeface="Calibri"/>
-                <a:ea typeface="Calibri"/>
-                <a:cs typeface="Calibri"/>
-                <a:sym typeface="Calibri"/>
-              </a:rPr>
-              <a:t>SCREEN PROTOTYPES</a:t>
-            </a:r>
-            <a:endParaRPr lang="en-US" sz="2400" b="0" i="0" u="none" strike="noStrike" cap="none" dirty="0">
-              <a:solidFill>
-                <a:srgbClr val="EEB211"/>
-              </a:solidFill>
-              <a:latin typeface="Calibri"/>
-              <a:ea typeface="Calibri"/>
-              <a:cs typeface="Calibri"/>
-              <a:sym typeface="Calibri"/>
-            </a:endParaRPr>
-          </a:p>
-        </p:txBody>
-      </p:sp>
-      <p:pic>
-        <p:nvPicPr>
-          <p:cNvPr id="3" name="Picture 2"/>
-          <p:cNvPicPr>
-            <a:picLocks noChangeAspect="1"/>
-          </p:cNvPicPr>
-          <p:nvPr/>
-        </p:nvPicPr>
-        <p:blipFill>
-          <a:blip r:embed="rId3"/>
-          <a:stretch>
-            <a:fillRect/>
-          </a:stretch>
-        </p:blipFill>
-        <p:spPr>
-          <a:xfrm>
-            <a:off x="137933" y="1169092"/>
-            <a:ext cx="8868131" cy="2032445"/>
-          </a:xfrm>
-          <a:prstGeom prst="rect">
-            <a:avLst/>
-          </a:prstGeom>
-        </p:spPr>
-      </p:pic>
-    </p:spTree>
-    <p:extLst>
-      <p:ext uri="{BB962C8B-B14F-4D97-AF65-F5344CB8AC3E}">
-        <p14:creationId xmlns:p14="http://schemas.microsoft.com/office/powerpoint/2010/main" val="2291339440"/>
-      </p:ext>
-    </p:extLst>
-  </p:cSld>
-  <p:clrMapOvr>
-    <a:masterClrMapping/>
-  </p:clrMapOvr>
-  <p:transition spd="slow">
-    <p:cut/>
-  </p:transition>
-  <p:timing>
-    <p:tnLst>
-      <p:par>
-        <p:cTn id="1" dur="indefinite" restart="never" nodeType="tmRoot"/>
-      </p:par>
-    </p:tnLst>
-  </p:timing>
-</p:sld>
-</file>
-
-<file path=ppt/slides/slide12.xml><?xml version="1.0" encoding="utf-8"?>
-<p:sld xmlns:a="http://schemas.openxmlformats.org/drawingml/2006/main" xmlns:r="http://schemas.openxmlformats.org/officeDocument/2006/relationships" xmlns:p="http://schemas.openxmlformats.org/presentationml/2006/main">
-  <p:cSld>
-    <p:spTree>
-      <p:nvGrpSpPr>
-        <p:cNvPr id="1" name="Shape 131"/>
-        <p:cNvGrpSpPr/>
-        <p:nvPr/>
-      </p:nvGrpSpPr>
-      <p:grpSpPr>
-        <a:xfrm>
-          <a:off x="0" y="0"/>
-          <a:ext cx="0" cy="0"/>
-          <a:chOff x="0" y="0"/>
-          <a:chExt cx="0" cy="0"/>
-        </a:xfrm>
-      </p:grpSpPr>
-      <p:sp>
-        <p:nvSpPr>
-          <p:cNvPr id="132" name="Shape 132"/>
-          <p:cNvSpPr txBox="1">
-            <a:spLocks noGrp="1"/>
-          </p:cNvSpPr>
-          <p:nvPr>
-            <p:ph type="body" idx="1"/>
-          </p:nvPr>
-        </p:nvSpPr>
-        <p:spPr>
-          <a:xfrm>
-            <a:off x="0" y="999067"/>
-            <a:ext cx="9143998" cy="5164664"/>
-          </a:xfrm>
-          <a:prstGeom prst="rect">
-            <a:avLst/>
-          </a:prstGeom>
-          <a:noFill/>
-          <a:ln>
-            <a:noFill/>
-          </a:ln>
-        </p:spPr>
-        <p:txBody>
-          <a:bodyPr lIns="274300" tIns="45700" rIns="274300" bIns="45700" anchor="t" anchorCtr="0">
-            <a:noAutofit/>
-          </a:bodyPr>
-          <a:lstStyle/>
-          <a:p>
-            <a:pPr lvl="1" indent="-288544">
-              <a:spcBef>
-                <a:spcPts val="1020"/>
-              </a:spcBef>
-              <a:spcAft>
-                <a:spcPts val="0"/>
-              </a:spcAft>
-            </a:pPr>
-            <a:endParaRPr lang="en-US" sz="2000" dirty="0" smtClean="0"/>
-          </a:p>
-          <a:p>
-            <a:pPr marL="0" marR="0" lvl="0" indent="0" algn="l" rtl="0">
-              <a:spcBef>
-                <a:spcPts val="1080"/>
-              </a:spcBef>
-              <a:spcAft>
-                <a:spcPts val="0"/>
-              </a:spcAft>
-              <a:buClr>
-                <a:schemeClr val="lt1"/>
-              </a:buClr>
-              <a:buSzPct val="25000"/>
-              <a:buFont typeface="Arial"/>
-              <a:buNone/>
-            </a:pPr>
-            <a:endParaRPr sz="2400" b="0" i="0" u="none" strike="noStrike" cap="none" dirty="0">
-              <a:solidFill>
-                <a:schemeClr val="lt1"/>
-              </a:solidFill>
-              <a:latin typeface="Calibri"/>
-              <a:ea typeface="Calibri"/>
-              <a:cs typeface="Calibri"/>
-              <a:sym typeface="Calibri"/>
-            </a:endParaRPr>
-          </a:p>
-          <a:p>
-            <a:pPr marL="0" marR="0" lvl="0" indent="0" algn="l" rtl="0">
-              <a:spcBef>
-                <a:spcPts val="1080"/>
-              </a:spcBef>
-              <a:spcAft>
-                <a:spcPts val="0"/>
-              </a:spcAft>
-              <a:buClr>
-                <a:schemeClr val="lt1"/>
-              </a:buClr>
-              <a:buSzPct val="25000"/>
-              <a:buFont typeface="Arial"/>
-              <a:buNone/>
-            </a:pPr>
-            <a:endParaRPr sz="2400" b="0" i="0" u="none" strike="noStrike" cap="none" dirty="0">
-              <a:solidFill>
-                <a:schemeClr val="lt1"/>
-              </a:solidFill>
-              <a:latin typeface="Calibri"/>
-              <a:ea typeface="Calibri"/>
-              <a:cs typeface="Calibri"/>
-              <a:sym typeface="Calibri"/>
-            </a:endParaRPr>
-          </a:p>
-          <a:p>
-            <a:pPr marL="0" marR="0" lvl="0" indent="0" algn="l" rtl="0">
-              <a:spcBef>
-                <a:spcPts val="1080"/>
-              </a:spcBef>
-              <a:spcAft>
-                <a:spcPts val="0"/>
-              </a:spcAft>
-              <a:buClr>
-                <a:schemeClr val="lt1"/>
-              </a:buClr>
-              <a:buSzPct val="25000"/>
-              <a:buFont typeface="Arial"/>
-              <a:buNone/>
-            </a:pPr>
-            <a:endParaRPr sz="2400" b="0" i="0" u="none" strike="noStrike" cap="none" dirty="0">
-              <a:solidFill>
-                <a:schemeClr val="lt1"/>
-              </a:solidFill>
-              <a:latin typeface="Calibri"/>
-              <a:ea typeface="Calibri"/>
-              <a:cs typeface="Calibri"/>
-              <a:sym typeface="Calibri"/>
-            </a:endParaRPr>
-          </a:p>
-          <a:p>
-            <a:pPr marL="0" marR="0" lvl="0" indent="0" algn="l" rtl="0">
-              <a:spcBef>
-                <a:spcPts val="1080"/>
-              </a:spcBef>
-              <a:spcAft>
-                <a:spcPts val="0"/>
-              </a:spcAft>
-              <a:buClr>
-                <a:schemeClr val="lt1"/>
-              </a:buClr>
-              <a:buSzPct val="25000"/>
-              <a:buFont typeface="Arial"/>
-              <a:buNone/>
-            </a:pPr>
-            <a:endParaRPr sz="2400" b="0" i="0" u="none" strike="noStrike" cap="none" dirty="0">
-              <a:solidFill>
-                <a:schemeClr val="lt1"/>
-              </a:solidFill>
-              <a:latin typeface="Calibri"/>
-              <a:ea typeface="Calibri"/>
-              <a:cs typeface="Calibri"/>
-              <a:sym typeface="Calibri"/>
-            </a:endParaRPr>
-          </a:p>
-          <a:p>
-            <a:pPr marL="0" marR="0" lvl="0" indent="0" algn="l" rtl="0">
-              <a:spcBef>
-                <a:spcPts val="1080"/>
-              </a:spcBef>
-              <a:spcAft>
-                <a:spcPts val="0"/>
-              </a:spcAft>
-              <a:buClr>
-                <a:schemeClr val="lt1"/>
-              </a:buClr>
-              <a:buSzPct val="25000"/>
-              <a:buFont typeface="Arial"/>
-              <a:buNone/>
-            </a:pPr>
             <a:endParaRPr lang="en-US" sz="2400" b="0" i="0" u="none" strike="noStrike" cap="none" dirty="0" smtClean="0">
               <a:solidFill>
                 <a:schemeClr val="lt1"/>
@@ -20055,7 +19542,7 @@
 </p:sld>
 </file>
 
-<file path=ppt/slides/slide13.xml><?xml version="1.0" encoding="utf-8"?>
+<file path=ppt/slides/slide12.xml><?xml version="1.0" encoding="utf-8"?>
 <p:sld xmlns:a="http://schemas.openxmlformats.org/drawingml/2006/main" xmlns:r="http://schemas.openxmlformats.org/officeDocument/2006/relationships" xmlns:p="http://schemas.openxmlformats.org/presentationml/2006/main">
   <p:cSld>
     <p:spTree>
@@ -20352,19 +19839,7 @@
                 <a:cs typeface="Calibri"/>
                 <a:sym typeface="Calibri"/>
               </a:rPr>
-              <a:t>        </a:t>
-            </a:r>
-            <a:r>
-              <a:rPr lang="en-US" sz="2400" b="0" i="0" u="none" strike="noStrike" cap="none" dirty="0" smtClean="0">
-                <a:solidFill>
-                  <a:srgbClr val="EEB211"/>
-                </a:solidFill>
-                <a:latin typeface="Calibri"/>
-                <a:ea typeface="Calibri"/>
-                <a:cs typeface="Calibri"/>
-                <a:sym typeface="Calibri"/>
-              </a:rPr>
-              <a:t>CONCERNS</a:t>
+              <a:t>        CONCERNS</a:t>
             </a:r>
             <a:endParaRPr lang="en-US" sz="2400" b="0" i="0" u="none" strike="noStrike" cap="none" dirty="0">
               <a:solidFill>
@@ -20396,7 +19871,7 @@
 </p:sld>
 </file>
 
-<file path=ppt/slides/slide14.xml><?xml version="1.0" encoding="utf-8"?>
+<file path=ppt/slides/slide13.xml><?xml version="1.0" encoding="utf-8"?>
 <p:sld xmlns:a="http://schemas.openxmlformats.org/drawingml/2006/main" xmlns:r="http://schemas.openxmlformats.org/officeDocument/2006/relationships" xmlns:p="http://schemas.openxmlformats.org/presentationml/2006/main">
   <p:cSld>
     <p:spTree>
@@ -20745,19 +20220,7 @@
                 <a:cs typeface="Calibri"/>
                 <a:sym typeface="Calibri"/>
               </a:rPr>
-              <a:t>      NEXT </a:t>
-            </a:r>
-            <a:r>
-              <a:rPr lang="en-US" sz="2400" b="0" i="0" u="none" strike="noStrike" cap="none" dirty="0" smtClean="0">
-                <a:solidFill>
-                  <a:srgbClr val="EEB211"/>
-                </a:solidFill>
-                <a:latin typeface="Calibri"/>
-                <a:ea typeface="Calibri"/>
-                <a:cs typeface="Calibri"/>
-                <a:sym typeface="Calibri"/>
-              </a:rPr>
-              <a:t>STEPS</a:t>
+              <a:t>      NEXT STEPS</a:t>
             </a:r>
             <a:endParaRPr lang="en-US" sz="2400" b="0" i="0" u="none" strike="noStrike" cap="none" dirty="0">
               <a:solidFill>
@@ -21141,19 +20604,7 @@
                 <a:cs typeface="Calibri"/>
                 <a:sym typeface="Calibri"/>
               </a:rPr>
-              <a:t>Next </a:t>
-            </a:r>
-            <a:r>
-              <a:rPr lang="en-US" sz="2400" b="0" i="0" u="none" strike="noStrike" cap="none" dirty="0" smtClean="0">
-                <a:solidFill>
-                  <a:schemeClr val="lt1"/>
-                </a:solidFill>
-                <a:latin typeface="Calibri"/>
-                <a:ea typeface="Calibri"/>
-                <a:cs typeface="Calibri"/>
-                <a:sym typeface="Calibri"/>
-              </a:rPr>
-              <a:t>Steps</a:t>
+              <a:t>Next Steps</a:t>
             </a:r>
             <a:endParaRPr lang="en-US" sz="2400" b="0" i="0" u="none" strike="noStrike" cap="none" dirty="0">
               <a:solidFill>
@@ -22943,54 +22394,144 @@
           </a:bodyPr>
           <a:lstStyle/>
           <a:p>
-            <a:pPr marL="0" marR="0" lvl="0" indent="0" algn="l" rtl="0">
+            <a:pPr marL="342900" lvl="0" indent="-342900">
               <a:spcBef>
                 <a:spcPts val="1080"/>
               </a:spcBef>
               <a:spcAft>
                 <a:spcPts val="0"/>
               </a:spcAft>
-              <a:buClr>
-                <a:schemeClr val="lt1"/>
-              </a:buClr>
               <a:buSzPct val="25000"/>
-              <a:buFont typeface="Arial"/>
-              <a:buNone/>
+              <a:buFont typeface="Arial" panose="020B0604020202020204" pitchFamily="34" charset="0"/>
+              <a:buChar char="•"/>
             </a:pPr>
-            <a:endParaRPr sz="2400" b="0" i="0" u="none" strike="noStrike" cap="none" dirty="0">
-              <a:solidFill>
-                <a:schemeClr val="lt1"/>
-              </a:solidFill>
-              <a:latin typeface="Calibri"/>
-              <a:ea typeface="Calibri"/>
-              <a:cs typeface="Calibri"/>
-              <a:sym typeface="Calibri"/>
-            </a:endParaRPr>
+            <a:r>
+              <a:rPr lang="en-US" dirty="0"/>
+              <a:t>Backend: http://sparkjava.com/</a:t>
+            </a:r>
           </a:p>
           <a:p>
-            <a:pPr marL="0" marR="0" lvl="0" indent="0" algn="l" rtl="0">
+            <a:pPr marL="342900" lvl="0" indent="-342900">
               <a:spcBef>
                 <a:spcPts val="1080"/>
               </a:spcBef>
               <a:spcAft>
                 <a:spcPts val="0"/>
               </a:spcAft>
-              <a:buClr>
-                <a:schemeClr val="lt1"/>
-              </a:buClr>
               <a:buSzPct val="25000"/>
-              <a:buFont typeface="Arial"/>
-              <a:buNone/>
+              <a:buFont typeface="Arial" panose="020B0604020202020204" pitchFamily="34" charset="0"/>
+              <a:buChar char="•"/>
             </a:pPr>
-            <a:endParaRPr sz="2400" b="0" i="0" u="none" strike="noStrike" cap="none" dirty="0">
-              <a:solidFill>
-                <a:schemeClr val="lt1"/>
-              </a:solidFill>
-              <a:latin typeface="Calibri"/>
-              <a:ea typeface="Calibri"/>
-              <a:cs typeface="Calibri"/>
-              <a:sym typeface="Calibri"/>
-            </a:endParaRPr>
+            <a:r>
+              <a:rPr lang="en-US" dirty="0"/>
+              <a:t> </a:t>
+            </a:r>
+            <a:r>
+              <a:rPr lang="en-US" dirty="0" smtClean="0"/>
+              <a:t>User </a:t>
+            </a:r>
+            <a:r>
+              <a:rPr lang="en-US" dirty="0"/>
+              <a:t>Authentication: https://github.com/pac4j/play-pac4j?</a:t>
+            </a:r>
+          </a:p>
+          <a:p>
+            <a:pPr marL="342900" lvl="0" indent="-342900">
+              <a:spcBef>
+                <a:spcPts val="1080"/>
+              </a:spcBef>
+              <a:spcAft>
+                <a:spcPts val="0"/>
+              </a:spcAft>
+              <a:buSzPct val="25000"/>
+              <a:buFont typeface="Arial" panose="020B0604020202020204" pitchFamily="34" charset="0"/>
+              <a:buChar char="•"/>
+            </a:pPr>
+            <a:r>
+              <a:rPr lang="en-US" dirty="0"/>
+              <a:t> </a:t>
+            </a:r>
+            <a:r>
+              <a:rPr lang="en-US" dirty="0" smtClean="0"/>
+              <a:t>Database </a:t>
+            </a:r>
+            <a:r>
+              <a:rPr lang="en-US" dirty="0"/>
+              <a:t>Access: SQL2o -https://</a:t>
+            </a:r>
+            <a:r>
+              <a:rPr lang="en-US" dirty="0" smtClean="0"/>
+              <a:t>sparktutorials.github.io/2015/04/29/spark-and-sql2o.html</a:t>
+            </a:r>
+            <a:endParaRPr lang="en-US" dirty="0"/>
+          </a:p>
+          <a:p>
+            <a:pPr marL="342900" lvl="0" indent="-342900">
+              <a:spcBef>
+                <a:spcPts val="1080"/>
+              </a:spcBef>
+              <a:spcAft>
+                <a:spcPts val="0"/>
+              </a:spcAft>
+              <a:buSzPct val="25000"/>
+              <a:buFont typeface="Arial" panose="020B0604020202020204" pitchFamily="34" charset="0"/>
+              <a:buChar char="•"/>
+            </a:pPr>
+            <a:r>
+              <a:rPr lang="en-US" dirty="0"/>
+              <a:t>Database: PostgreSQL</a:t>
+            </a:r>
+          </a:p>
+          <a:p>
+            <a:pPr marL="342900" lvl="0" indent="-342900">
+              <a:spcBef>
+                <a:spcPts val="1080"/>
+              </a:spcBef>
+              <a:spcAft>
+                <a:spcPts val="0"/>
+              </a:spcAft>
+              <a:buSzPct val="25000"/>
+              <a:buFont typeface="Arial" panose="020B0604020202020204" pitchFamily="34" charset="0"/>
+              <a:buChar char="•"/>
+            </a:pPr>
+            <a:r>
+              <a:rPr lang="en-US" dirty="0"/>
+              <a:t>Front End CSS/HTML: Bootstrap http://getbootstrap.com/</a:t>
+            </a:r>
+          </a:p>
+          <a:p>
+            <a:pPr marL="342900" lvl="0" indent="-342900">
+              <a:spcBef>
+                <a:spcPts val="1080"/>
+              </a:spcBef>
+              <a:spcAft>
+                <a:spcPts val="0"/>
+              </a:spcAft>
+              <a:buSzPct val="25000"/>
+              <a:buFont typeface="Arial" panose="020B0604020202020204" pitchFamily="34" charset="0"/>
+              <a:buChar char="•"/>
+            </a:pPr>
+            <a:r>
+              <a:rPr lang="en-US" dirty="0"/>
+              <a:t>Javascript Framework: EmberJS http://emberjs.com/</a:t>
+            </a:r>
+          </a:p>
+          <a:p>
+            <a:pPr marL="342900" lvl="0" indent="-342900">
+              <a:spcBef>
+                <a:spcPts val="1080"/>
+              </a:spcBef>
+              <a:spcAft>
+                <a:spcPts val="0"/>
+              </a:spcAft>
+              <a:buSzPct val="25000"/>
+              <a:buFont typeface="Arial" panose="020B0604020202020204" pitchFamily="34" charset="0"/>
+              <a:buChar char="•"/>
+            </a:pPr>
+            <a:r>
+              <a:rPr lang="en-US" dirty="0"/>
+              <a:t>Hosting: Heroku</a:t>
+            </a:r>
           </a:p>
           <a:p>
             <a:pPr marL="0" marR="0" lvl="0" indent="0" algn="l" rtl="0">
@@ -23094,342 +22635,6 @@
                 <a:cs typeface="Calibri"/>
                 <a:sym typeface="Calibri"/>
               </a:rPr>
-              <a:t> 			</a:t>
-            </a:r>
-            <a:r>
-              <a:rPr lang="en-US" sz="2400" b="0" i="0" u="none" strike="noStrike" cap="none" dirty="0" smtClean="0">
-                <a:solidFill>
-                  <a:srgbClr val="EEB211"/>
-                </a:solidFill>
-                <a:latin typeface="Calibri"/>
-                <a:ea typeface="Calibri"/>
-                <a:cs typeface="Calibri"/>
-                <a:sym typeface="Calibri"/>
-              </a:rPr>
-              <a:t>GANTT CHART</a:t>
-            </a:r>
-            <a:endParaRPr lang="en-US" sz="2400" b="0" i="0" u="none" strike="noStrike" cap="none" dirty="0">
-              <a:solidFill>
-                <a:srgbClr val="EEB211"/>
-              </a:solidFill>
-              <a:latin typeface="Calibri"/>
-              <a:ea typeface="Calibri"/>
-              <a:cs typeface="Calibri"/>
-              <a:sym typeface="Calibri"/>
-            </a:endParaRPr>
-          </a:p>
-        </p:txBody>
-      </p:sp>
-    </p:spTree>
-    <p:extLst>
-      <p:ext uri="{BB962C8B-B14F-4D97-AF65-F5344CB8AC3E}">
-        <p14:creationId xmlns:p14="http://schemas.microsoft.com/office/powerpoint/2010/main" val="1780416216"/>
-      </p:ext>
-    </p:extLst>
-  </p:cSld>
-  <p:clrMapOvr>
-    <a:masterClrMapping/>
-  </p:clrMapOvr>
-  <p:transition spd="slow">
-    <p:cut/>
-  </p:transition>
-  <p:timing>
-    <p:tnLst>
-      <p:par>
-        <p:cTn id="1" dur="indefinite" restart="never" nodeType="tmRoot"/>
-      </p:par>
-    </p:tnLst>
-  </p:timing>
-</p:sld>
-</file>
-
-<file path=ppt/slides/slide6.xml><?xml version="1.0" encoding="utf-8"?>
-<p:sld xmlns:a="http://schemas.openxmlformats.org/drawingml/2006/main" xmlns:r="http://schemas.openxmlformats.org/officeDocument/2006/relationships" xmlns:p="http://schemas.openxmlformats.org/presentationml/2006/main">
-  <p:cSld>
-    <p:spTree>
-      <p:nvGrpSpPr>
-        <p:cNvPr id="1" name="Shape 137"/>
-        <p:cNvGrpSpPr/>
-        <p:nvPr/>
-      </p:nvGrpSpPr>
-      <p:grpSpPr>
-        <a:xfrm>
-          <a:off x="0" y="0"/>
-          <a:ext cx="0" cy="0"/>
-          <a:chOff x="0" y="0"/>
-          <a:chExt cx="0" cy="0"/>
-        </a:xfrm>
-      </p:grpSpPr>
-      <p:sp>
-        <p:nvSpPr>
-          <p:cNvPr id="138" name="Shape 138"/>
-          <p:cNvSpPr txBox="1">
-            <a:spLocks noGrp="1"/>
-          </p:cNvSpPr>
-          <p:nvPr>
-            <p:ph type="body" idx="1"/>
-          </p:nvPr>
-        </p:nvSpPr>
-        <p:spPr>
-          <a:xfrm>
-            <a:off x="0" y="999067"/>
-            <a:ext cx="9143998" cy="5164664"/>
-          </a:xfrm>
-          <a:prstGeom prst="rect">
-            <a:avLst/>
-          </a:prstGeom>
-          <a:noFill/>
-          <a:ln>
-            <a:noFill/>
-          </a:ln>
-        </p:spPr>
-        <p:txBody>
-          <a:bodyPr lIns="274300" tIns="45700" rIns="274300" bIns="45700" anchor="t" anchorCtr="0">
-            <a:noAutofit/>
-          </a:bodyPr>
-          <a:lstStyle/>
-          <a:p>
-            <a:pPr marL="342900" lvl="0" indent="-342900">
-              <a:spcBef>
-                <a:spcPts val="1080"/>
-              </a:spcBef>
-              <a:spcAft>
-                <a:spcPts val="0"/>
-              </a:spcAft>
-              <a:buSzPct val="25000"/>
-              <a:buFont typeface="Arial" panose="020B0604020202020204" pitchFamily="34" charset="0"/>
-              <a:buChar char="•"/>
-            </a:pPr>
-            <a:r>
-              <a:rPr lang="en-US" dirty="0"/>
-              <a:t>Backend: http://sparkjava.com/</a:t>
-            </a:r>
-          </a:p>
-          <a:p>
-            <a:pPr marL="342900" lvl="0" indent="-342900">
-              <a:spcBef>
-                <a:spcPts val="1080"/>
-              </a:spcBef>
-              <a:spcAft>
-                <a:spcPts val="0"/>
-              </a:spcAft>
-              <a:buSzPct val="25000"/>
-              <a:buFont typeface="Arial" panose="020B0604020202020204" pitchFamily="34" charset="0"/>
-              <a:buChar char="•"/>
-            </a:pPr>
-            <a:r>
-              <a:rPr lang="en-US" dirty="0"/>
-              <a:t> </a:t>
-            </a:r>
-            <a:r>
-              <a:rPr lang="en-US" dirty="0" smtClean="0"/>
-              <a:t>User </a:t>
-            </a:r>
-            <a:r>
-              <a:rPr lang="en-US" dirty="0"/>
-              <a:t>Authentication: https://github.com/pac4j/play-pac4j?</a:t>
-            </a:r>
-          </a:p>
-          <a:p>
-            <a:pPr marL="342900" lvl="0" indent="-342900">
-              <a:spcBef>
-                <a:spcPts val="1080"/>
-              </a:spcBef>
-              <a:spcAft>
-                <a:spcPts val="0"/>
-              </a:spcAft>
-              <a:buSzPct val="25000"/>
-              <a:buFont typeface="Arial" panose="020B0604020202020204" pitchFamily="34" charset="0"/>
-              <a:buChar char="•"/>
-            </a:pPr>
-            <a:r>
-              <a:rPr lang="en-US" dirty="0"/>
-              <a:t> </a:t>
-            </a:r>
-            <a:r>
-              <a:rPr lang="en-US" dirty="0" smtClean="0"/>
-              <a:t>Database </a:t>
-            </a:r>
-            <a:r>
-              <a:rPr lang="en-US" dirty="0"/>
-              <a:t>Access: SQL2o -https://</a:t>
-            </a:r>
-            <a:r>
-              <a:rPr lang="en-US" dirty="0" smtClean="0"/>
-              <a:t>sparktutorials.github.io/2015/04/29/spark-and-sql2o.html</a:t>
-            </a:r>
-            <a:endParaRPr lang="en-US" dirty="0"/>
-          </a:p>
-          <a:p>
-            <a:pPr marL="342900" lvl="0" indent="-342900">
-              <a:spcBef>
-                <a:spcPts val="1080"/>
-              </a:spcBef>
-              <a:spcAft>
-                <a:spcPts val="0"/>
-              </a:spcAft>
-              <a:buSzPct val="25000"/>
-              <a:buFont typeface="Arial" panose="020B0604020202020204" pitchFamily="34" charset="0"/>
-              <a:buChar char="•"/>
-            </a:pPr>
-            <a:r>
-              <a:rPr lang="en-US" dirty="0"/>
-              <a:t>Database: PostgreSQL</a:t>
-            </a:r>
-          </a:p>
-          <a:p>
-            <a:pPr marL="342900" lvl="0" indent="-342900">
-              <a:spcBef>
-                <a:spcPts val="1080"/>
-              </a:spcBef>
-              <a:spcAft>
-                <a:spcPts val="0"/>
-              </a:spcAft>
-              <a:buSzPct val="25000"/>
-              <a:buFont typeface="Arial" panose="020B0604020202020204" pitchFamily="34" charset="0"/>
-              <a:buChar char="•"/>
-            </a:pPr>
-            <a:r>
-              <a:rPr lang="en-US" dirty="0"/>
-              <a:t>Front End CSS/HTML: Bootstrap http://getbootstrap.com/</a:t>
-            </a:r>
-          </a:p>
-          <a:p>
-            <a:pPr marL="342900" lvl="0" indent="-342900">
-              <a:spcBef>
-                <a:spcPts val="1080"/>
-              </a:spcBef>
-              <a:spcAft>
-                <a:spcPts val="0"/>
-              </a:spcAft>
-              <a:buSzPct val="25000"/>
-              <a:buFont typeface="Arial" panose="020B0604020202020204" pitchFamily="34" charset="0"/>
-              <a:buChar char="•"/>
-            </a:pPr>
-            <a:r>
-              <a:rPr lang="en-US" dirty="0"/>
-              <a:t>Javascript Framework: EmberJS http://emberjs.com/</a:t>
-            </a:r>
-          </a:p>
-          <a:p>
-            <a:pPr marL="342900" lvl="0" indent="-342900">
-              <a:spcBef>
-                <a:spcPts val="1080"/>
-              </a:spcBef>
-              <a:spcAft>
-                <a:spcPts val="0"/>
-              </a:spcAft>
-              <a:buSzPct val="25000"/>
-              <a:buFont typeface="Arial" panose="020B0604020202020204" pitchFamily="34" charset="0"/>
-              <a:buChar char="•"/>
-            </a:pPr>
-            <a:r>
-              <a:rPr lang="en-US" dirty="0"/>
-              <a:t>Hosting: Heroku</a:t>
-            </a:r>
-          </a:p>
-          <a:p>
-            <a:pPr marL="0" marR="0" lvl="0" indent="0" algn="l" rtl="0">
-              <a:spcBef>
-                <a:spcPts val="1080"/>
-              </a:spcBef>
-              <a:spcAft>
-                <a:spcPts val="0"/>
-              </a:spcAft>
-              <a:buClr>
-                <a:schemeClr val="lt1"/>
-              </a:buClr>
-              <a:buSzPct val="25000"/>
-              <a:buFont typeface="Arial"/>
-              <a:buNone/>
-            </a:pPr>
-            <a:endParaRPr sz="2400" b="0" i="0" u="none" strike="noStrike" cap="none" dirty="0">
-              <a:solidFill>
-                <a:schemeClr val="lt1"/>
-              </a:solidFill>
-              <a:latin typeface="Calibri"/>
-              <a:ea typeface="Calibri"/>
-              <a:cs typeface="Calibri"/>
-              <a:sym typeface="Calibri"/>
-            </a:endParaRPr>
-          </a:p>
-          <a:p>
-            <a:pPr marL="0" marR="0" lvl="0" indent="0" algn="l" rtl="0">
-              <a:spcBef>
-                <a:spcPts val="1080"/>
-              </a:spcBef>
-              <a:spcAft>
-                <a:spcPts val="0"/>
-              </a:spcAft>
-              <a:buClr>
-                <a:schemeClr val="lt1"/>
-              </a:buClr>
-              <a:buSzPct val="25000"/>
-              <a:buFont typeface="Arial"/>
-              <a:buNone/>
-            </a:pPr>
-            <a:endParaRPr sz="2400" b="0" i="0" u="none" strike="noStrike" cap="none" dirty="0">
-              <a:solidFill>
-                <a:schemeClr val="lt1"/>
-              </a:solidFill>
-              <a:latin typeface="Calibri"/>
-              <a:ea typeface="Calibri"/>
-              <a:cs typeface="Calibri"/>
-              <a:sym typeface="Calibri"/>
-            </a:endParaRPr>
-          </a:p>
-        </p:txBody>
-      </p:sp>
-      <p:sp>
-        <p:nvSpPr>
-          <p:cNvPr id="139" name="Shape 139"/>
-          <p:cNvSpPr txBox="1">
-            <a:spLocks noGrp="1"/>
-          </p:cNvSpPr>
-          <p:nvPr>
-            <p:ph type="title"/>
-          </p:nvPr>
-        </p:nvSpPr>
-        <p:spPr>
-          <a:xfrm>
-            <a:off x="0" y="0"/>
-            <a:ext cx="9144000" cy="991351"/>
-          </a:xfrm>
-          <a:prstGeom prst="rect">
-            <a:avLst/>
-          </a:prstGeom>
-          <a:noFill/>
-          <a:ln>
-            <a:noFill/>
-          </a:ln>
-        </p:spPr>
-        <p:txBody>
-          <a:bodyPr lIns="274300" tIns="45700" rIns="91425" bIns="45700" anchor="ctr" anchorCtr="0">
-            <a:noAutofit/>
-          </a:bodyPr>
-          <a:lstStyle/>
-          <a:p>
-            <a:pPr marL="0" marR="0" lvl="0" indent="0" algn="l" rtl="0">
-              <a:spcBef>
-                <a:spcPts val="0"/>
-              </a:spcBef>
-              <a:buClr>
-                <a:srgbClr val="EEB211"/>
-              </a:buClr>
-              <a:buSzPct val="25000"/>
-              <a:buFont typeface="Calibri"/>
-              <a:buNone/>
-            </a:pPr>
-            <a:r>
-              <a:rPr lang="en-US" sz="2400" b="0" i="0" u="none" strike="noStrike" cap="none" dirty="0">
-                <a:solidFill>
-                  <a:srgbClr val="EEB211"/>
-                </a:solidFill>
-                <a:latin typeface="Calibri"/>
-                <a:ea typeface="Calibri"/>
-                <a:cs typeface="Calibri"/>
-                <a:sym typeface="Calibri"/>
-              </a:rPr>
               <a:t> 		</a:t>
             </a:r>
             <a:r>
@@ -23479,7 +22684,7 @@
 </p:sld>
 </file>
 
-<file path=ppt/slides/slide7.xml><?xml version="1.0" encoding="utf-8"?>
+<file path=ppt/slides/slide6.xml><?xml version="1.0" encoding="utf-8"?>
 <p:sld xmlns:a="http://schemas.openxmlformats.org/drawingml/2006/main" xmlns:r="http://schemas.openxmlformats.org/officeDocument/2006/relationships" xmlns:p="http://schemas.openxmlformats.org/presentationml/2006/main">
   <p:cSld>
     <p:spTree>
@@ -23676,19 +22881,7 @@
                 <a:cs typeface="Calibri"/>
                 <a:sym typeface="Calibri"/>
               </a:rPr>
-              <a:t>HIGH LEVEL PROJECT </a:t>
-            </a:r>
-            <a:r>
-              <a:rPr lang="en-US" sz="2400" b="0" i="0" u="none" strike="noStrike" cap="none" dirty="0" smtClean="0">
-                <a:solidFill>
-                  <a:srgbClr val="EEB211"/>
-                </a:solidFill>
-                <a:latin typeface="Calibri"/>
-                <a:ea typeface="Calibri"/>
-                <a:cs typeface="Calibri"/>
-                <a:sym typeface="Calibri"/>
-              </a:rPr>
-              <a:t>ARCHITECTURE</a:t>
+              <a:t>HIGH LEVEL PROJECT ARCHITECTURE</a:t>
             </a:r>
             <a:endParaRPr lang="en-US" sz="2400" b="0" i="0" u="none" strike="noStrike" cap="none" dirty="0">
               <a:solidFill>
@@ -23755,6 +22948,359 @@
 </p:sld>
 </file>
 
+<file path=ppt/slides/slide7.xml><?xml version="1.0" encoding="utf-8"?>
+<p:sld xmlns:a="http://schemas.openxmlformats.org/drawingml/2006/main" xmlns:r="http://schemas.openxmlformats.org/officeDocument/2006/relationships" xmlns:p="http://schemas.openxmlformats.org/presentationml/2006/main">
+  <p:cSld>
+    <p:spTree>
+      <p:nvGrpSpPr>
+        <p:cNvPr id="1" name="Shape 137"/>
+        <p:cNvGrpSpPr/>
+        <p:nvPr/>
+      </p:nvGrpSpPr>
+      <p:grpSpPr>
+        <a:xfrm>
+          <a:off x="0" y="0"/>
+          <a:ext cx="0" cy="0"/>
+          <a:chOff x="0" y="0"/>
+          <a:chExt cx="0" cy="0"/>
+        </a:xfrm>
+      </p:grpSpPr>
+      <p:sp>
+        <p:nvSpPr>
+          <p:cNvPr id="138" name="Shape 138"/>
+          <p:cNvSpPr txBox="1">
+            <a:spLocks noGrp="1"/>
+          </p:cNvSpPr>
+          <p:nvPr>
+            <p:ph type="body" idx="1"/>
+          </p:nvPr>
+        </p:nvSpPr>
+        <p:spPr>
+          <a:xfrm>
+            <a:off x="0" y="999067"/>
+            <a:ext cx="9143998" cy="5164664"/>
+          </a:xfrm>
+          <a:prstGeom prst="rect">
+            <a:avLst/>
+          </a:prstGeom>
+          <a:noFill/>
+          <a:ln>
+            <a:noFill/>
+          </a:ln>
+        </p:spPr>
+        <p:txBody>
+          <a:bodyPr lIns="274300" tIns="45700" rIns="274300" bIns="45700" anchor="t" anchorCtr="0">
+            <a:noAutofit/>
+          </a:bodyPr>
+          <a:lstStyle/>
+          <a:p>
+            <a:pPr lvl="0">
+              <a:spcBef>
+                <a:spcPts val="0"/>
+              </a:spcBef>
+              <a:spcAft>
+                <a:spcPts val="0"/>
+              </a:spcAft>
+              <a:buSzPct val="25000"/>
+            </a:pPr>
+            <a:r>
+              <a:rPr lang="en-US" dirty="0"/>
+              <a:t>FHIR REST </a:t>
+            </a:r>
+            <a:r>
+              <a:rPr lang="en-US" dirty="0" smtClean="0"/>
+              <a:t>API</a:t>
+            </a:r>
+          </a:p>
+          <a:p>
+            <a:pPr lvl="1">
+              <a:spcBef>
+                <a:spcPts val="0"/>
+              </a:spcBef>
+              <a:spcAft>
+                <a:spcPts val="0"/>
+              </a:spcAft>
+              <a:buSzPct val="25000"/>
+            </a:pPr>
+            <a:r>
+              <a:rPr lang="en-US" dirty="0"/>
+              <a:t>A Java REST client will be used to interact with the FHIR REST API.  Our web client will interact with FHIR via our application REST API.</a:t>
+            </a:r>
+            <a:endParaRPr lang="en-US" dirty="0" smtClean="0"/>
+          </a:p>
+          <a:p>
+            <a:pPr lvl="0">
+              <a:spcBef>
+                <a:spcPts val="0"/>
+              </a:spcBef>
+              <a:spcAft>
+                <a:spcPts val="0"/>
+              </a:spcAft>
+              <a:buSzPct val="25000"/>
+            </a:pPr>
+            <a:endParaRPr lang="en-US" sz="2400" b="0" i="0" u="none" strike="noStrike" cap="none" dirty="0">
+              <a:solidFill>
+                <a:schemeClr val="lt1"/>
+              </a:solidFill>
+              <a:latin typeface="Calibri"/>
+              <a:ea typeface="Calibri"/>
+              <a:cs typeface="Calibri"/>
+              <a:sym typeface="Calibri"/>
+            </a:endParaRPr>
+          </a:p>
+          <a:p>
+            <a:pPr lvl="0">
+              <a:spcBef>
+                <a:spcPts val="0"/>
+              </a:spcBef>
+              <a:spcAft>
+                <a:spcPts val="0"/>
+              </a:spcAft>
+              <a:buSzPct val="25000"/>
+            </a:pPr>
+            <a:r>
+              <a:rPr lang="en-US" dirty="0"/>
+              <a:t>PostgreSQL </a:t>
+            </a:r>
+            <a:r>
+              <a:rPr lang="en-US" dirty="0" smtClean="0"/>
+              <a:t>Database</a:t>
+            </a:r>
+          </a:p>
+          <a:p>
+            <a:pPr lvl="1">
+              <a:spcBef>
+                <a:spcPts val="0"/>
+              </a:spcBef>
+              <a:spcAft>
+                <a:spcPts val="0"/>
+              </a:spcAft>
+              <a:buSzPct val="25000"/>
+            </a:pPr>
+            <a:r>
+              <a:rPr lang="en-US" dirty="0"/>
+              <a:t>We will be storing and accessing data in a PostgreSQL database that is hosted in Heroku.  Our web application will communicate with the API via the Java application using SQL libraries that wrap JDBC SQL queries.</a:t>
+            </a:r>
+            <a:endParaRPr lang="en-US" dirty="0" smtClean="0"/>
+          </a:p>
+          <a:p>
+            <a:pPr lvl="0">
+              <a:spcBef>
+                <a:spcPts val="0"/>
+              </a:spcBef>
+              <a:spcAft>
+                <a:spcPts val="0"/>
+              </a:spcAft>
+              <a:buSzPct val="25000"/>
+            </a:pPr>
+            <a:endParaRPr lang="en-US" sz="2400" b="0" i="0" u="none" strike="noStrike" cap="none" dirty="0">
+              <a:solidFill>
+                <a:schemeClr val="lt1"/>
+              </a:solidFill>
+              <a:latin typeface="Calibri"/>
+              <a:ea typeface="Calibri"/>
+              <a:cs typeface="Calibri"/>
+              <a:sym typeface="Calibri"/>
+            </a:endParaRPr>
+          </a:p>
+          <a:p>
+            <a:pPr lvl="0">
+              <a:spcBef>
+                <a:spcPts val="0"/>
+              </a:spcBef>
+              <a:spcAft>
+                <a:spcPts val="0"/>
+              </a:spcAft>
+              <a:buSzPct val="25000"/>
+            </a:pPr>
+            <a:r>
+              <a:rPr lang="en-US" dirty="0"/>
+              <a:t>REST API/User </a:t>
+            </a:r>
+            <a:r>
+              <a:rPr lang="en-US" dirty="0" smtClean="0"/>
+              <a:t>Authentication</a:t>
+            </a:r>
+          </a:p>
+          <a:p>
+            <a:pPr lvl="1">
+              <a:spcBef>
+                <a:spcPts val="0"/>
+              </a:spcBef>
+              <a:spcAft>
+                <a:spcPts val="0"/>
+              </a:spcAft>
+              <a:buSzPct val="25000"/>
+            </a:pPr>
+            <a:r>
+              <a:rPr lang="en-US" dirty="0"/>
+              <a:t>Our web client will communicate with our backend exclusively through our REST API.  The REST API will send and receive JSON formatted data.  Requests that require user authentication will be accessed via authenticated requests</a:t>
+            </a:r>
+            <a:r>
+              <a:rPr lang="en-US" dirty="0" smtClean="0"/>
+              <a:t>.</a:t>
+            </a:r>
+            <a:endParaRPr sz="2400" b="0" i="0" u="none" strike="noStrike" cap="none" dirty="0">
+              <a:solidFill>
+                <a:schemeClr val="lt1"/>
+              </a:solidFill>
+              <a:latin typeface="Calibri"/>
+              <a:ea typeface="Calibri"/>
+              <a:cs typeface="Calibri"/>
+              <a:sym typeface="Calibri"/>
+            </a:endParaRPr>
+          </a:p>
+          <a:p>
+            <a:pPr marL="0" marR="0" lvl="0" indent="0" algn="l" rtl="0">
+              <a:spcBef>
+                <a:spcPts val="1080"/>
+              </a:spcBef>
+              <a:spcAft>
+                <a:spcPts val="0"/>
+              </a:spcAft>
+              <a:buClr>
+                <a:schemeClr val="lt1"/>
+              </a:buClr>
+              <a:buSzPct val="25000"/>
+              <a:buFont typeface="Arial"/>
+              <a:buNone/>
+            </a:pPr>
+            <a:endParaRPr sz="2400" b="0" i="0" u="none" strike="noStrike" cap="none" dirty="0">
+              <a:solidFill>
+                <a:schemeClr val="lt1"/>
+              </a:solidFill>
+              <a:latin typeface="Calibri"/>
+              <a:ea typeface="Calibri"/>
+              <a:cs typeface="Calibri"/>
+              <a:sym typeface="Calibri"/>
+            </a:endParaRPr>
+          </a:p>
+          <a:p>
+            <a:pPr marL="0" marR="0" lvl="0" indent="0" algn="l" rtl="0">
+              <a:spcBef>
+                <a:spcPts val="1080"/>
+              </a:spcBef>
+              <a:spcAft>
+                <a:spcPts val="0"/>
+              </a:spcAft>
+              <a:buClr>
+                <a:schemeClr val="lt1"/>
+              </a:buClr>
+              <a:buSzPct val="25000"/>
+              <a:buFont typeface="Arial"/>
+              <a:buNone/>
+            </a:pPr>
+            <a:endParaRPr sz="2400" b="0" i="0" u="none" strike="noStrike" cap="none" dirty="0">
+              <a:solidFill>
+                <a:schemeClr val="lt1"/>
+              </a:solidFill>
+              <a:latin typeface="Calibri"/>
+              <a:ea typeface="Calibri"/>
+              <a:cs typeface="Calibri"/>
+              <a:sym typeface="Calibri"/>
+            </a:endParaRPr>
+          </a:p>
+        </p:txBody>
+      </p:sp>
+      <p:sp>
+        <p:nvSpPr>
+          <p:cNvPr id="139" name="Shape 139"/>
+          <p:cNvSpPr txBox="1">
+            <a:spLocks noGrp="1"/>
+          </p:cNvSpPr>
+          <p:nvPr>
+            <p:ph type="title"/>
+          </p:nvPr>
+        </p:nvSpPr>
+        <p:spPr>
+          <a:xfrm>
+            <a:off x="0" y="0"/>
+            <a:ext cx="9144000" cy="991351"/>
+          </a:xfrm>
+          <a:prstGeom prst="rect">
+            <a:avLst/>
+          </a:prstGeom>
+          <a:noFill/>
+          <a:ln>
+            <a:noFill/>
+          </a:ln>
+        </p:spPr>
+        <p:txBody>
+          <a:bodyPr lIns="274300" tIns="45700" rIns="91425" bIns="45700" anchor="ctr" anchorCtr="0">
+            <a:noAutofit/>
+          </a:bodyPr>
+          <a:lstStyle/>
+          <a:p>
+            <a:pPr marL="0" marR="0" lvl="0" indent="0" algn="l" rtl="0">
+              <a:spcBef>
+                <a:spcPts val="0"/>
+              </a:spcBef>
+              <a:buClr>
+                <a:srgbClr val="EEB211"/>
+              </a:buClr>
+              <a:buSzPct val="25000"/>
+              <a:buFont typeface="Calibri"/>
+              <a:buNone/>
+            </a:pPr>
+            <a:r>
+              <a:rPr lang="en-US" sz="2400" b="0" i="0" u="none" strike="noStrike" cap="none" dirty="0">
+                <a:solidFill>
+                  <a:srgbClr val="EEB211"/>
+                </a:solidFill>
+                <a:latin typeface="Calibri"/>
+                <a:ea typeface="Calibri"/>
+                <a:cs typeface="Calibri"/>
+                <a:sym typeface="Calibri"/>
+              </a:rPr>
+              <a:t> 		</a:t>
+            </a:r>
+            <a:r>
+              <a:rPr lang="en-US" sz="2400" b="0" i="0" u="none" strike="noStrike" cap="none" dirty="0" smtClean="0">
+                <a:solidFill>
+                  <a:srgbClr val="EEB211"/>
+                </a:solidFill>
+                <a:latin typeface="Calibri"/>
+                <a:ea typeface="Calibri"/>
+                <a:cs typeface="Calibri"/>
+                <a:sym typeface="Calibri"/>
+              </a:rPr>
+              <a:t>HIGH LEVEL PROJECT ARCHITECTURE</a:t>
+            </a:r>
+            <a:endParaRPr lang="en-US" sz="2400" b="0" i="0" u="none" strike="noStrike" cap="none" dirty="0">
+              <a:solidFill>
+                <a:srgbClr val="EEB211"/>
+              </a:solidFill>
+              <a:latin typeface="Calibri"/>
+              <a:ea typeface="Calibri"/>
+              <a:cs typeface="Calibri"/>
+              <a:sym typeface="Calibri"/>
+            </a:endParaRPr>
+          </a:p>
+        </p:txBody>
+      </p:sp>
+    </p:spTree>
+    <p:extLst>
+      <p:ext uri="{BB962C8B-B14F-4D97-AF65-F5344CB8AC3E}">
+        <p14:creationId xmlns:p14="http://schemas.microsoft.com/office/powerpoint/2010/main" val="3338069729"/>
+      </p:ext>
+    </p:extLst>
+  </p:cSld>
+  <p:clrMapOvr>
+    <a:masterClrMapping/>
+  </p:clrMapOvr>
+  <p:transition spd="slow">
+    <p:cut/>
+  </p:transition>
+  <p:timing>
+    <p:tnLst>
+      <p:par>
+        <p:cTn id="1" dur="indefinite" restart="never" nodeType="tmRoot"/>
+      </p:par>
+    </p:tnLst>
+  </p:timing>
+</p:sld>
+</file>
+
 <file path=ppt/slides/slide8.xml><?xml version="1.0" encoding="utf-8"?>
 <p:sld xmlns:a="http://schemas.openxmlformats.org/drawingml/2006/main" xmlns:r="http://schemas.openxmlformats.org/officeDocument/2006/relationships" xmlns:p="http://schemas.openxmlformats.org/presentationml/2006/main">
   <p:cSld>
@@ -23811,12 +23357,16 @@
               <a:buSzPct val="25000"/>
             </a:pPr>
             <a:r>
+              <a:rPr lang="en-US" dirty="0" smtClean="0"/>
+              <a:t>JavaScript </a:t>
+            </a:r>
+            <a:r>
               <a:rPr lang="en-US" dirty="0"/>
-              <a:t>FHIR REST </a:t>
+              <a:t>Web </a:t>
             </a:r>
             <a:r>
               <a:rPr lang="en-US" dirty="0" smtClean="0"/>
-              <a:t>API</a:t>
+              <a:t>Application/EmberJS</a:t>
             </a:r>
           </a:p>
           <a:p>
@@ -23831,21 +23381,9 @@
             </a:pPr>
             <a:r>
               <a:rPr lang="en-US" dirty="0"/>
-              <a:t>A Java REST client will be used to interact with the FHIR REST API.  Our web client will interact with FHIR via our application REST API.</a:t>
+              <a:t>Our client application will be a web-based single-page application (SPA).  We are using the EmberJS MVC framework to handle all the client side logic, including routing, rendering, and communicating with the API.</a:t>
             </a:r>
-            <a:endParaRPr lang="en-US" dirty="0" smtClean="0"/>
-          </a:p>
-          <a:p>
-            <a:pPr lvl="0">
-              <a:spcBef>
-                <a:spcPts val="0"/>
-              </a:spcBef>
-              <a:spcAft>
-                <a:spcPts val="0"/>
-              </a:spcAft>
-              <a:buSzPct val="25000"/>
-            </a:pPr>
-            <a:endParaRPr lang="en-US" sz="2400" b="0" i="0" u="none" strike="noStrike" cap="none" dirty="0">
+            <a:endParaRPr sz="2100" b="0" i="0" u="none" strike="noStrike" cap="none" dirty="0">
               <a:solidFill>
                 <a:schemeClr val="lt1"/>
               </a:solidFill>
@@ -23856,97 +23394,20 @@
             </a:endParaRPr>
           </a:p>
           <a:p>
-            <a:pPr lvl="0">
-              <a:spcBef>
-                <a:spcPts val="0"/>
+            <a:pPr marL="0" marR="0" lvl="0" indent="0" algn="l" rtl="0">
+              <a:spcBef>
+                <a:spcPts val="1080"/>
               </a:spcBef>
               <a:spcAft>
                 <a:spcPts val="0"/>
               </a:spcAft>
+              <a:buClr>
+                <a:schemeClr val="lt1"/>
+              </a:buClr>
               <a:buSzPct val="25000"/>
+              <a:buFont typeface="Arial"/>
+              <a:buNone/>
             </a:pPr>
-            <a:r>
-              <a:rPr lang="en-US" dirty="0"/>
-              <a:t>PostgreSQL </a:t>
-            </a:r>
-            <a:r>
-              <a:rPr lang="en-US" dirty="0" smtClean="0"/>
-              <a:t>Database</a:t>
-            </a:r>
-          </a:p>
-          <a:p>
-            <a:pPr lvl="1">
-              <a:spcBef>
-                <a:spcPts val="0"/>
-              </a:spcBef>
-              <a:spcAft>
-                <a:spcPts val="0"/>
-              </a:spcAft>
-              <a:buSzPct val="25000"/>
-            </a:pPr>
-            <a:r>
-              <a:rPr lang="en-US" dirty="0"/>
-              <a:t>We will be storing and accessing data in a PostgreSQL database that is hosted in Heroku.  Our web application will communicate with the API via the Java application using SQL libraries that wrap JDBC SQL queries.</a:t>
-            </a:r>
-            <a:endParaRPr lang="en-US" dirty="0" smtClean="0"/>
-          </a:p>
-          <a:p>
-            <a:pPr lvl="0">
-              <a:spcBef>
-                <a:spcPts val="0"/>
-              </a:spcBef>
-              <a:spcAft>
-                <a:spcPts val="0"/>
-              </a:spcAft>
-              <a:buSzPct val="25000"/>
-            </a:pPr>
-            <a:endParaRPr lang="en-US" sz="2400" b="0" i="0" u="none" strike="noStrike" cap="none" dirty="0">
-              <a:solidFill>
-                <a:schemeClr val="lt1"/>
-              </a:solidFill>
-              <a:latin typeface="Calibri"/>
-              <a:ea typeface="Calibri"/>
-              <a:cs typeface="Calibri"/>
-              <a:sym typeface="Calibri"/>
-            </a:endParaRPr>
-          </a:p>
-          <a:p>
-            <a:pPr lvl="0">
-              <a:spcBef>
-                <a:spcPts val="0"/>
-              </a:spcBef>
-              <a:spcAft>
-                <a:spcPts val="0"/>
-              </a:spcAft>
-              <a:buSzPct val="25000"/>
-            </a:pPr>
-            <a:r>
-              <a:rPr lang="en-US" dirty="0"/>
-              <a:t>REST API/User </a:t>
-            </a:r>
-            <a:r>
-              <a:rPr lang="en-US" dirty="0" smtClean="0"/>
-              <a:t>Authentication</a:t>
-            </a:r>
-          </a:p>
-          <a:p>
-            <a:pPr lvl="1">
-              <a:spcBef>
-                <a:spcPts val="0"/>
-              </a:spcBef>
-              <a:spcAft>
-                <a:spcPts val="0"/>
-              </a:spcAft>
-              <a:buSzPct val="25000"/>
-            </a:pPr>
-            <a:r>
-              <a:rPr lang="en-US" dirty="0"/>
-              <a:t>Our web client will communicate with our backend exclusively through our REST API.  The REST API will send and receive JSON formatted data.  Requests that require user authentication will be accessed via authenticated requests</a:t>
-            </a:r>
-            <a:r>
-              <a:rPr lang="en-US" dirty="0" smtClean="0"/>
-              <a:t>.</a:t>
-            </a:r>
             <a:endParaRPr sz="2400" b="0" i="0" u="none" strike="noStrike" cap="none" dirty="0">
               <a:solidFill>
                 <a:schemeClr val="lt1"/>
@@ -24071,19 +23532,7 @@
                 <a:cs typeface="Calibri"/>
                 <a:sym typeface="Calibri"/>
               </a:rPr>
-              <a:t>HIGH </a:t>
-            </a:r>
-            <a:r>
-              <a:rPr lang="en-US" sz="2400" b="0" i="0" u="none" strike="noStrike" cap="none" dirty="0" smtClean="0">
-                <a:solidFill>
-                  <a:srgbClr val="EEB211"/>
-                </a:solidFill>
-                <a:latin typeface="Calibri"/>
-                <a:ea typeface="Calibri"/>
-                <a:cs typeface="Calibri"/>
-                <a:sym typeface="Calibri"/>
-              </a:rPr>
-              <a:t>LEVEL PROJECT ARCHITECTURE</a:t>
+              <a:t>HIGH LEVEL PROJECT ARCHITECTURE</a:t>
             </a:r>
             <a:endParaRPr lang="en-US" sz="2400" b="0" i="0" u="none" strike="noStrike" cap="none" dirty="0">
               <a:solidFill>
@@ -24100,7 +23549,7 @@
     </p:spTree>
     <p:extLst>
       <p:ext uri="{BB962C8B-B14F-4D97-AF65-F5344CB8AC3E}">
-        <p14:creationId xmlns:p14="http://schemas.microsoft.com/office/powerpoint/2010/main" val="3338069729"/>
+        <p14:creationId xmlns:p14="http://schemas.microsoft.com/office/powerpoint/2010/main" val="1203509783"/>
       </p:ext>
     </p:extLst>
   </p:cSld>
@@ -24125,7 +23574,7 @@
   <p:cSld>
     <p:spTree>
       <p:nvGrpSpPr>
-        <p:cNvPr id="1" name="Shape 137"/>
+        <p:cNvPr id="1" name="Shape 131"/>
         <p:cNvGrpSpPr/>
         <p:nvPr/>
       </p:nvGrpSpPr>
@@ -24139,7 +23588,7 @@
       </p:grpSpPr>
       <p:sp>
         <p:nvSpPr>
-          <p:cNvPr id="138" name="Shape 138"/>
+          <p:cNvPr id="132" name="Shape 132"/>
           <p:cNvSpPr txBox="1">
             <a:spLocks noGrp="1"/>
           </p:cNvSpPr>
@@ -24166,43 +23615,32 @@
           </a:bodyPr>
           <a:lstStyle/>
           <a:p>
-            <a:pPr lvl="0">
-              <a:spcBef>
-                <a:spcPts val="0"/>
+            <a:pPr lvl="1" indent="-288544">
+              <a:spcBef>
+                <a:spcPts val="1020"/>
               </a:spcBef>
               <a:spcAft>
                 <a:spcPts val="0"/>
               </a:spcAft>
-              <a:buSzPct val="25000"/>
             </a:pPr>
-            <a:r>
-              <a:rPr lang="en-US" dirty="0" smtClean="0"/>
-              <a:t>JavaScript </a:t>
-            </a:r>
-            <a:r>
-              <a:rPr lang="en-US" dirty="0"/>
-              <a:t>Web </a:t>
-            </a:r>
-            <a:r>
-              <a:rPr lang="en-US" dirty="0" smtClean="0"/>
-              <a:t>Application/EmberJS</a:t>
-            </a:r>
+            <a:endParaRPr lang="en-US" sz="2000" dirty="0" smtClean="0"/>
           </a:p>
           <a:p>
-            <a:pPr lvl="1">
-              <a:spcBef>
-                <a:spcPts val="0"/>
+            <a:pPr marL="0" marR="0" lvl="0" indent="0" algn="l" rtl="0">
+              <a:spcBef>
+                <a:spcPts val="1080"/>
               </a:spcBef>
               <a:spcAft>
                 <a:spcPts val="0"/>
               </a:spcAft>
+              <a:buClr>
+                <a:schemeClr val="lt1"/>
+              </a:buClr>
               <a:buSzPct val="25000"/>
+              <a:buFont typeface="Arial"/>
+              <a:buNone/>
             </a:pPr>
-            <a:r>
-              <a:rPr lang="en-US" dirty="0"/>
-              <a:t>Our client application will be a web-based single-page application (SPA).  We are using the EmberJS MVC framework to handle all the client side logic, including routing, rendering, and communicating with the API.</a:t>
-            </a:r>
-            <a:endParaRPr sz="2100" b="0" i="0" u="none" strike="noStrike" cap="none" dirty="0">
+            <a:endParaRPr sz="2400" b="0" i="0" u="none" strike="noStrike" cap="none" dirty="0">
               <a:solidFill>
                 <a:schemeClr val="lt1"/>
               </a:solidFill>
@@ -24278,6 +23716,127 @@
               <a:buNone/>
             </a:pPr>
             <a:endParaRPr sz="2400" b="0" i="0" u="none" strike="noStrike" cap="none" dirty="0">
+              <a:solidFill>
+                <a:schemeClr val="lt1"/>
+              </a:solidFill>
+              <a:latin typeface="Calibri"/>
+              <a:ea typeface="Calibri"/>
+              <a:cs typeface="Calibri"/>
+              <a:sym typeface="Calibri"/>
+            </a:endParaRPr>
+          </a:p>
+          <a:p>
+            <a:pPr marL="0" marR="0" lvl="0" indent="0" algn="l" rtl="0">
+              <a:spcBef>
+                <a:spcPts val="1080"/>
+              </a:spcBef>
+              <a:spcAft>
+                <a:spcPts val="0"/>
+              </a:spcAft>
+              <a:buClr>
+                <a:schemeClr val="lt1"/>
+              </a:buClr>
+              <a:buSzPct val="25000"/>
+              <a:buFont typeface="Arial"/>
+              <a:buNone/>
+            </a:pPr>
+            <a:endParaRPr lang="en-US" sz="2400" b="0" i="0" u="none" strike="noStrike" cap="none" dirty="0" smtClean="0">
+              <a:solidFill>
+                <a:schemeClr val="lt1"/>
+              </a:solidFill>
+              <a:latin typeface="Calibri"/>
+              <a:ea typeface="Calibri"/>
+              <a:cs typeface="Calibri"/>
+              <a:sym typeface="Calibri"/>
+            </a:endParaRPr>
+          </a:p>
+          <a:p>
+            <a:pPr marL="0" marR="0" lvl="0" indent="0" algn="l" rtl="0">
+              <a:spcBef>
+                <a:spcPts val="1080"/>
+              </a:spcBef>
+              <a:spcAft>
+                <a:spcPts val="0"/>
+              </a:spcAft>
+              <a:buClr>
+                <a:schemeClr val="lt1"/>
+              </a:buClr>
+              <a:buSzPct val="25000"/>
+              <a:buFont typeface="Arial"/>
+              <a:buNone/>
+            </a:pPr>
+            <a:endParaRPr lang="en-US" dirty="0"/>
+          </a:p>
+          <a:p>
+            <a:pPr marL="0" marR="0" lvl="0" indent="0" algn="l" rtl="0">
+              <a:spcBef>
+                <a:spcPts val="1080"/>
+              </a:spcBef>
+              <a:spcAft>
+                <a:spcPts val="0"/>
+              </a:spcAft>
+              <a:buClr>
+                <a:schemeClr val="lt1"/>
+              </a:buClr>
+              <a:buSzPct val="25000"/>
+              <a:buFont typeface="Arial"/>
+              <a:buNone/>
+            </a:pPr>
+            <a:endParaRPr lang="en-US" sz="2400" b="0" i="0" u="none" strike="noStrike" cap="none" dirty="0" smtClean="0">
+              <a:solidFill>
+                <a:schemeClr val="lt1"/>
+              </a:solidFill>
+              <a:latin typeface="Calibri"/>
+              <a:ea typeface="Calibri"/>
+              <a:cs typeface="Calibri"/>
+              <a:sym typeface="Calibri"/>
+            </a:endParaRPr>
+          </a:p>
+          <a:p>
+            <a:pPr marL="0" marR="0" lvl="0" indent="0" algn="l" rtl="0">
+              <a:spcBef>
+                <a:spcPts val="1080"/>
+              </a:spcBef>
+              <a:spcAft>
+                <a:spcPts val="0"/>
+              </a:spcAft>
+              <a:buClr>
+                <a:schemeClr val="lt1"/>
+              </a:buClr>
+              <a:buSzPct val="25000"/>
+              <a:buFont typeface="Arial"/>
+              <a:buNone/>
+            </a:pPr>
+            <a:endParaRPr lang="en-US" dirty="0"/>
+          </a:p>
+          <a:p>
+            <a:pPr marL="0" marR="0" lvl="0" indent="0" algn="l" rtl="0">
+              <a:spcBef>
+                <a:spcPts val="1080"/>
+              </a:spcBef>
+              <a:spcAft>
+                <a:spcPts val="0"/>
+              </a:spcAft>
+              <a:buClr>
+                <a:schemeClr val="lt1"/>
+              </a:buClr>
+              <a:buSzPct val="25000"/>
+              <a:buFont typeface="Arial"/>
+              <a:buNone/>
+            </a:pPr>
+            <a:r>
+              <a:rPr lang="en-US" sz="1800" b="0" i="0" u="none" strike="noStrike" cap="none" dirty="0" smtClean="0">
+                <a:solidFill>
+                  <a:schemeClr val="lt1"/>
+                </a:solidFill>
+                <a:latin typeface="Calibri"/>
+                <a:ea typeface="Calibri"/>
+                <a:cs typeface="Calibri"/>
+                <a:sym typeface="Calibri"/>
+              </a:rPr>
+              <a:t>This is the Welcome screen and the user can select the countries where she is travelling and also enter her D.O.B and select email  notifications and then hit “Plan My Trip”</a:t>
+            </a:r>
+            <a:endParaRPr sz="1800" b="0" i="0" u="none" strike="noStrike" cap="none" dirty="0">
               <a:solidFill>
                 <a:schemeClr val="lt1"/>
               </a:solidFill>
@@ -24291,7 +23850,7 @@
       </p:sp>
       <p:sp>
         <p:nvSpPr>
-          <p:cNvPr id="139" name="Shape 139"/>
+          <p:cNvPr id="133" name="Shape 133"/>
           <p:cNvSpPr txBox="1">
             <a:spLocks noGrp="1"/>
           </p:cNvSpPr>
@@ -24339,7 +23898,7 @@
                 <a:cs typeface="Calibri"/>
                 <a:sym typeface="Calibri"/>
               </a:rPr>
-              <a:t> 		</a:t>
+              <a:t> 			</a:t>
             </a:r>
             <a:r>
               <a:rPr lang="en-US" sz="2400" b="0" i="0" u="none" strike="noStrike" cap="none" dirty="0" smtClean="0">
@@ -24351,19 +23910,7 @@
                 <a:cs typeface="Calibri"/>
                 <a:sym typeface="Calibri"/>
               </a:rPr>
-              <a:t>HIGH </a:t>
-            </a:r>
-            <a:r>
-              <a:rPr lang="en-US" sz="2400" b="0" i="0" u="none" strike="noStrike" cap="none" dirty="0" smtClean="0">
-                <a:solidFill>
-                  <a:srgbClr val="EEB211"/>
-                </a:solidFill>
-                <a:latin typeface="Calibri"/>
-                <a:ea typeface="Calibri"/>
-                <a:cs typeface="Calibri"/>
-                <a:sym typeface="Calibri"/>
-              </a:rPr>
-              <a:t>LEVEL PROJECT ARCHITECTURE</a:t>
+              <a:t>SCREEN PROTOTYPES</a:t>
             </a:r>
             <a:endParaRPr lang="en-US" sz="2400" b="0" i="0" u="none" strike="noStrike" cap="none" dirty="0">
               <a:solidFill>
@@ -24377,10 +23924,34 @@
           </a:p>
         </p:txBody>
       </p:sp>
+      <p:pic>
+        <p:nvPicPr>
+          <p:cNvPr id="2" name="Picture 1"/>
+          <p:cNvPicPr>
+            <a:picLocks noChangeAspect="1"/>
+          </p:cNvPicPr>
+          <p:nvPr/>
+        </p:nvPicPr>
+        <p:blipFill>
+          <a:blip r:embed="rId3"/>
+          <a:stretch>
+            <a:fillRect/>
+          </a:stretch>
+        </p:blipFill>
+        <p:spPr>
+          <a:xfrm>
+            <a:off x="1137384" y="818652"/>
+            <a:ext cx="6296025" cy="4429125"/>
+          </a:xfrm>
+          <a:prstGeom prst="rect">
+            <a:avLst/>
+          </a:prstGeom>
+        </p:spPr>
+      </p:pic>
     </p:spTree>
     <p:extLst>
       <p:ext uri="{BB962C8B-B14F-4D97-AF65-F5344CB8AC3E}">
-        <p14:creationId xmlns:p14="http://schemas.microsoft.com/office/powerpoint/2010/main" val="1203509783"/>
+        <p14:creationId xmlns:p14="http://schemas.microsoft.com/office/powerpoint/2010/main" val="1709013539"/>
       </p:ext>
     </p:extLst>
   </p:cSld>

</xml_diff>

<commit_message>
small fix in presentation2
</commit_message>
<xml_diff>
--- a/Deliverable2/Presentation/Rock_Stars_Presentation.pptx
+++ b/Deliverable2/Presentation/Rock_Stars_Presentation.pptx
@@ -30,22 +30,6 @@
   </p:sldIdLst>
   <p:sldSz cx="9144000" cy="6858000" type="screen4x3"/>
   <p:notesSz cx="6858000" cy="9144000"/>
-  <p:embeddedFontLst>
-    <p:embeddedFont>
-      <p:font typeface="Calibri" panose="020F0502020204030204" pitchFamily="34" charset="0"/>
-      <p:regular r:id="rId22"/>
-      <p:bold r:id="rId23"/>
-      <p:italic r:id="rId24"/>
-      <p:boldItalic r:id="rId25"/>
-    </p:embeddedFont>
-    <p:embeddedFont>
-      <p:font typeface="Roboto" panose="020B0604020202020204" charset="0"/>
-      <p:regular r:id="rId26"/>
-      <p:bold r:id="rId27"/>
-      <p:italic r:id="rId28"/>
-      <p:boldItalic r:id="rId29"/>
-    </p:embeddedFont>
-  </p:embeddedFontLst>
   <p:defaultTextStyle>
     <a:defPPr marR="0" lvl="0" algn="l" rtl="0">
       <a:lnSpc>
@@ -250,7 +234,7 @@
   </p:defaultTextStyle>
   <p:extLst>
     <p:ext uri="{EFAFB233-063F-42B5-8137-9DF3F51BA10A}">
-      <p15:sldGuideLst xmlns:p15="http://schemas.microsoft.com/office/powerpoint/2012/main"/>
+      <p15:sldGuideLst xmlns:p15="http://schemas.microsoft.com/office/powerpoint/2012/main" xmlns=""/>
     </p:ext>
   </p:extLst>
 </p:presentation>
@@ -18494,7 +18478,19 @@
                 <a:cs typeface="Calibri"/>
                 <a:sym typeface="Calibri"/>
               </a:rPr>
-              <a:t>SAFE TRAVEL </a:t>
+              <a:t>SAFE </a:t>
+            </a:r>
+            <a:r>
+              <a:rPr lang="en-US" sz="4400" b="1" i="0" u="none" strike="noStrike" cap="none" dirty="0" smtClean="0">
+                <a:solidFill>
+                  <a:schemeClr val="lt1"/>
+                </a:solidFill>
+                <a:latin typeface="Calibri"/>
+                <a:ea typeface="Calibri"/>
+                <a:cs typeface="Calibri"/>
+                <a:sym typeface="Calibri"/>
+              </a:rPr>
+              <a:t>TRAVELS </a:t>
             </a:r>
             <a:r>
               <a:rPr lang="en-US" sz="4400" b="1" i="0" u="none" strike="noStrike" cap="none" dirty="0" smtClean="0">
@@ -18713,13 +18709,13 @@
   <p:clrMapOvr>
     <a:masterClrMapping/>
   </p:clrMapOvr>
-  <p:transition spd="slow">
+  <p:transition xmlns:p14="http://schemas.microsoft.com/office/powerpoint/2010/main" spd="slow">
     <p:cut/>
   </p:transition>
   <p:timing>
     <p:tnLst>
       <p:par>
-        <p:cTn id="1" dur="indefinite" restart="never" nodeType="tmRoot"/>
+        <p:cTn xmlns:p14="http://schemas.microsoft.com/office/powerpoint/2010/main" id="1" dur="indefinite" restart="never" nodeType="tmRoot"/>
       </p:par>
     </p:tnLst>
   </p:timing>
@@ -19144,13 +19140,13 @@
   <p:clrMapOvr>
     <a:masterClrMapping/>
   </p:clrMapOvr>
-  <p:transition spd="slow">
+  <p:transition xmlns:p14="http://schemas.microsoft.com/office/powerpoint/2010/main" spd="slow">
     <p:cut/>
   </p:transition>
   <p:timing>
     <p:tnLst>
       <p:par>
-        <p:cTn id="1" dur="indefinite" restart="never" nodeType="tmRoot"/>
+        <p:cTn xmlns:p14="http://schemas.microsoft.com/office/powerpoint/2010/main" id="1" dur="indefinite" restart="never" nodeType="tmRoot"/>
       </p:par>
     </p:tnLst>
   </p:timing>
@@ -19529,13 +19525,13 @@
   <p:clrMapOvr>
     <a:masterClrMapping/>
   </p:clrMapOvr>
-  <p:transition spd="slow">
+  <p:transition xmlns:p14="http://schemas.microsoft.com/office/powerpoint/2010/main" spd="slow">
     <p:cut/>
   </p:transition>
   <p:timing>
     <p:tnLst>
       <p:par>
-        <p:cTn id="1" dur="indefinite" restart="never" nodeType="tmRoot"/>
+        <p:cTn xmlns:p14="http://schemas.microsoft.com/office/powerpoint/2010/main" id="1" dur="indefinite" restart="never" nodeType="tmRoot"/>
       </p:par>
     </p:tnLst>
   </p:timing>
@@ -19858,13 +19854,13 @@
   <p:clrMapOvr>
     <a:masterClrMapping/>
   </p:clrMapOvr>
-  <p:transition spd="slow">
+  <p:transition xmlns:p14="http://schemas.microsoft.com/office/powerpoint/2010/main" spd="slow">
     <p:cut/>
   </p:transition>
   <p:timing>
     <p:tnLst>
       <p:par>
-        <p:cTn id="1" dur="indefinite" restart="never" nodeType="tmRoot"/>
+        <p:cTn xmlns:p14="http://schemas.microsoft.com/office/powerpoint/2010/main" id="1" dur="indefinite" restart="never" nodeType="tmRoot"/>
       </p:par>
     </p:tnLst>
   </p:timing>
@@ -20244,13 +20240,13 @@
   <p:clrMapOvr>
     <a:masterClrMapping/>
   </p:clrMapOvr>
-  <p:transition spd="slow">
+  <p:transition xmlns:p14="http://schemas.microsoft.com/office/powerpoint/2010/main" spd="slow">
     <p:cut/>
   </p:transition>
   <p:timing>
     <p:tnLst>
       <p:par>
-        <p:cTn id="1" dur="indefinite" restart="never" nodeType="tmRoot"/>
+        <p:cTn xmlns:p14="http://schemas.microsoft.com/office/powerpoint/2010/main" id="1" dur="indefinite" restart="never" nodeType="tmRoot"/>
       </p:par>
     </p:tnLst>
   </p:timing>
@@ -20774,13 +20770,13 @@
   <p:clrMapOvr>
     <a:masterClrMapping/>
   </p:clrMapOvr>
-  <p:transition spd="slow">
+  <p:transition xmlns:p14="http://schemas.microsoft.com/office/powerpoint/2010/main" spd="slow">
     <p:cut/>
   </p:transition>
   <p:timing>
     <p:tnLst>
       <p:par>
-        <p:cTn id="1" dur="indefinite" restart="never" nodeType="tmRoot"/>
+        <p:cTn xmlns:p14="http://schemas.microsoft.com/office/powerpoint/2010/main" id="1" dur="indefinite" restart="never" nodeType="tmRoot"/>
       </p:par>
     </p:tnLst>
   </p:timing>
@@ -20963,13 +20959,13 @@
   <p:clrMapOvr>
     <a:masterClrMapping/>
   </p:clrMapOvr>
-  <p:transition spd="slow">
+  <p:transition xmlns:p14="http://schemas.microsoft.com/office/powerpoint/2010/main" spd="slow">
     <p:cut/>
   </p:transition>
   <p:timing>
     <p:tnLst>
       <p:par>
-        <p:cTn id="1" dur="indefinite" restart="never" nodeType="tmRoot"/>
+        <p:cTn xmlns:p14="http://schemas.microsoft.com/office/powerpoint/2010/main" id="1" dur="indefinite" restart="never" nodeType="tmRoot"/>
       </p:par>
     </p:tnLst>
   </p:timing>
@@ -22335,13 +22331,13 @@
   <p:clrMapOvr>
     <a:masterClrMapping/>
   </p:clrMapOvr>
-  <p:transition spd="slow" advTm="34069">
+  <p:transition xmlns:p14="http://schemas.microsoft.com/office/powerpoint/2010/main" spd="slow" advTm="34069">
     <p:cut/>
   </p:transition>
   <p:timing>
     <p:tnLst>
       <p:par>
-        <p:cTn id="1" dur="indefinite" restart="never" nodeType="tmRoot"/>
+        <p:cTn xmlns:p14="http://schemas.microsoft.com/office/powerpoint/2010/main" id="1" dur="indefinite" restart="never" nodeType="tmRoot"/>
       </p:par>
     </p:tnLst>
   </p:timing>
@@ -22671,13 +22667,13 @@
   <p:clrMapOvr>
     <a:masterClrMapping/>
   </p:clrMapOvr>
-  <p:transition spd="slow">
+  <p:transition xmlns:p14="http://schemas.microsoft.com/office/powerpoint/2010/main" spd="slow">
     <p:cut/>
   </p:transition>
   <p:timing>
     <p:tnLst>
       <p:par>
-        <p:cTn id="1" dur="indefinite" restart="never" nodeType="tmRoot"/>
+        <p:cTn xmlns:p14="http://schemas.microsoft.com/office/powerpoint/2010/main" id="1" dur="indefinite" restart="never" nodeType="tmRoot"/>
       </p:par>
     </p:tnLst>
   </p:timing>
@@ -22935,13 +22931,13 @@
   <p:clrMapOvr>
     <a:masterClrMapping/>
   </p:clrMapOvr>
-  <p:transition spd="slow" advTm="19973">
+  <p:transition xmlns:p14="http://schemas.microsoft.com/office/powerpoint/2010/main" spd="slow" advTm="19973">
     <p:cut/>
   </p:transition>
   <p:timing>
     <p:tnLst>
       <p:par>
-        <p:cTn id="1" dur="indefinite" restart="never" nodeType="tmRoot"/>
+        <p:cTn xmlns:p14="http://schemas.microsoft.com/office/powerpoint/2010/main" id="1" dur="indefinite" restart="never" nodeType="tmRoot"/>
       </p:par>
     </p:tnLst>
   </p:timing>
@@ -23288,13 +23284,13 @@
   <p:clrMapOvr>
     <a:masterClrMapping/>
   </p:clrMapOvr>
-  <p:transition spd="slow">
+  <p:transition xmlns:p14="http://schemas.microsoft.com/office/powerpoint/2010/main" spd="slow">
     <p:cut/>
   </p:transition>
   <p:timing>
     <p:tnLst>
       <p:par>
-        <p:cTn id="1" dur="indefinite" restart="never" nodeType="tmRoot"/>
+        <p:cTn xmlns:p14="http://schemas.microsoft.com/office/powerpoint/2010/main" id="1" dur="indefinite" restart="never" nodeType="tmRoot"/>
       </p:par>
     </p:tnLst>
   </p:timing>
@@ -23556,13 +23552,13 @@
   <p:clrMapOvr>
     <a:masterClrMapping/>
   </p:clrMapOvr>
-  <p:transition spd="slow">
+  <p:transition xmlns:p14="http://schemas.microsoft.com/office/powerpoint/2010/main" spd="slow">
     <p:cut/>
   </p:transition>
   <p:timing>
     <p:tnLst>
       <p:par>
-        <p:cTn id="1" dur="indefinite" restart="never" nodeType="tmRoot"/>
+        <p:cTn xmlns:p14="http://schemas.microsoft.com/office/powerpoint/2010/main" id="1" dur="indefinite" restart="never" nodeType="tmRoot"/>
       </p:par>
     </p:tnLst>
   </p:timing>
@@ -23958,13 +23954,13 @@
   <p:clrMapOvr>
     <a:masterClrMapping/>
   </p:clrMapOvr>
-  <p:transition spd="slow">
+  <p:transition xmlns:p14="http://schemas.microsoft.com/office/powerpoint/2010/main" spd="slow">
     <p:cut/>
   </p:transition>
   <p:timing>
     <p:tnLst>
       <p:par>
-        <p:cTn id="1" dur="indefinite" restart="never" nodeType="tmRoot"/>
+        <p:cTn xmlns:p14="http://schemas.microsoft.com/office/powerpoint/2010/main" id="1" dur="indefinite" restart="never" nodeType="tmRoot"/>
       </p:par>
     </p:tnLst>
   </p:timing>

</xml_diff>